<commit_message>
Enhance Blazor app with new features and fixes
Added a `<NotFound>` section in `App.razor` for custom 404 handling. Introduced new parameters in `PersonCard.razor`. Updated `NavMenu.razor` with an additional navigation link. Enhanced `BindingPage.razor` with JS runtime injection, improved binding, and conditional UI elements. Added a new `PersonCard` instance in `ComponentsExample.razor`. Minor formatting change in `app.css`. Included a new script in `index.html`. Added `test.html` for testing purposes. Created `Details.razor` page with a welcome message. Added `functions.js` with a `test` function.
</commit_message>
<xml_diff>
--- a/slides/blazor_giorno_1.pptx
+++ b/slides/blazor_giorno_1.pptx
@@ -5,26 +5,30 @@
     <p:sldMasterId id="2147483672" r:id="rId1"/>
   </p:sldMasterIdLst>
   <p:notesMasterIdLst>
-    <p:notesMasterId r:id="rId16"/>
+    <p:notesMasterId r:id="rId20"/>
   </p:notesMasterIdLst>
   <p:handoutMasterIdLst>
-    <p:handoutMasterId r:id="rId17"/>
+    <p:handoutMasterId r:id="rId21"/>
   </p:handoutMasterIdLst>
   <p:sldIdLst>
     <p:sldId id="256" r:id="rId2"/>
-    <p:sldId id="262" r:id="rId3"/>
-    <p:sldId id="263" r:id="rId4"/>
-    <p:sldId id="264" r:id="rId5"/>
-    <p:sldId id="265" r:id="rId6"/>
-    <p:sldId id="266" r:id="rId7"/>
-    <p:sldId id="271" r:id="rId8"/>
-    <p:sldId id="272" r:id="rId9"/>
-    <p:sldId id="270" r:id="rId10"/>
-    <p:sldId id="267" r:id="rId11"/>
-    <p:sldId id="268" r:id="rId12"/>
-    <p:sldId id="269" r:id="rId13"/>
-    <p:sldId id="273" r:id="rId14"/>
-    <p:sldId id="274" r:id="rId15"/>
+    <p:sldId id="276" r:id="rId3"/>
+    <p:sldId id="262" r:id="rId4"/>
+    <p:sldId id="263" r:id="rId5"/>
+    <p:sldId id="264" r:id="rId6"/>
+    <p:sldId id="265" r:id="rId7"/>
+    <p:sldId id="278" r:id="rId8"/>
+    <p:sldId id="277" r:id="rId9"/>
+    <p:sldId id="266" r:id="rId10"/>
+    <p:sldId id="271" r:id="rId11"/>
+    <p:sldId id="272" r:id="rId12"/>
+    <p:sldId id="270" r:id="rId13"/>
+    <p:sldId id="267" r:id="rId14"/>
+    <p:sldId id="268" r:id="rId15"/>
+    <p:sldId id="269" r:id="rId16"/>
+    <p:sldId id="273" r:id="rId17"/>
+    <p:sldId id="274" r:id="rId18"/>
+    <p:sldId id="275" r:id="rId19"/>
   </p:sldIdLst>
   <p:sldSz cx="12192000" cy="6858000"/>
   <p:notesSz cx="6858000" cy="9144000"/>
@@ -230,7 +234,7 @@
             <a:pPr rtl="0"/>
             <a:fld id="{C0FA3576-2E34-44A5-91FF-3C53AC3DA648}" type="datetime1">
               <a:rPr lang="it-IT" smtClean="0"/>
-              <a:t>09/10/2025</a:t>
+              <a:t>16/10/2025</a:t>
             </a:fld>
             <a:endParaRPr lang="it-IT"/>
           </a:p>
@@ -412,7 +416,7 @@
             <a:fld id="{F8F21FEC-DF32-4E90-A279-29D5C0BB0773}" type="datetime1">
               <a:rPr lang="it-IT" smtClean="0"/>
               <a:pPr/>
-              <a:t>09/10/2025</a:t>
+              <a:t>16/10/2025</a:t>
             </a:fld>
             <a:endParaRPr lang="it-IT" dirty="0"/>
           </a:p>
@@ -1026,7 +1030,7 @@
             <a:pPr rtl="0"/>
             <a:fld id="{87A23933-3F77-4C59-A775-45E2435C8368}" type="datetime1">
               <a:rPr lang="it-IT" noProof="0" smtClean="0"/>
-              <a:t>09/10/2025</a:t>
+              <a:t>16/10/2025</a:t>
             </a:fld>
             <a:endParaRPr lang="it-IT" noProof="0"/>
           </a:p>
@@ -1291,7 +1295,7 @@
             <a:pPr rtl="0"/>
             <a:fld id="{4B4ECE9F-4108-4829-8F23-DFA9C926965D}" type="datetime1">
               <a:rPr lang="it-IT" noProof="0" smtClean="0"/>
-              <a:t>09/10/2025</a:t>
+              <a:t>16/10/2025</a:t>
             </a:fld>
             <a:endParaRPr lang="it-IT" noProof="0"/>
           </a:p>
@@ -1529,7 +1533,7 @@
             <a:pPr rtl="0"/>
             <a:fld id="{2AB59B6B-A2EF-4B30-AEF7-A3091D0F5449}" type="datetime1">
               <a:rPr lang="it-IT" noProof="0" smtClean="0"/>
-              <a:t>09/10/2025</a:t>
+              <a:t>16/10/2025</a:t>
             </a:fld>
             <a:endParaRPr lang="it-IT" noProof="0" dirty="0"/>
           </a:p>
@@ -1779,7 +1783,7 @@
             <a:pPr rtl="0"/>
             <a:fld id="{7F3FB14C-AC96-42E5-BE0B-73EFAA1A7EA7}" type="datetime1">
               <a:rPr lang="it-IT" noProof="0" smtClean="0"/>
-              <a:t>09/10/2025</a:t>
+              <a:t>16/10/2025</a:t>
             </a:fld>
             <a:endParaRPr lang="it-IT" noProof="0"/>
           </a:p>
@@ -2090,7 +2094,7 @@
             <a:pPr rtl="0"/>
             <a:fld id="{76327E91-20FF-43F1-A337-75953C73E7D7}" type="datetime1">
               <a:rPr lang="it-IT" noProof="0" smtClean="0"/>
-              <a:t>09/10/2025</a:t>
+              <a:t>16/10/2025</a:t>
             </a:fld>
             <a:endParaRPr lang="it-IT" noProof="0"/>
           </a:p>
@@ -2401,7 +2405,7 @@
             <a:pPr rtl="0"/>
             <a:fld id="{9EDCB701-B7F2-4988-9CFB-241C1D412354}" type="datetime1">
               <a:rPr lang="it-IT" noProof="0" smtClean="0"/>
-              <a:t>09/10/2025</a:t>
+              <a:t>16/10/2025</a:t>
             </a:fld>
             <a:endParaRPr lang="it-IT" noProof="0"/>
           </a:p>
@@ -2825,7 +2829,7 @@
             <a:pPr rtl="0"/>
             <a:fld id="{4B9B0459-76CC-4B94-A6C6-908B17D42BC8}" type="datetime1">
               <a:rPr lang="it-IT" noProof="0" smtClean="0"/>
-              <a:t>09/10/2025</a:t>
+              <a:t>16/10/2025</a:t>
             </a:fld>
             <a:endParaRPr lang="it-IT" noProof="0"/>
           </a:p>
@@ -2924,7 +2928,7 @@
             <a:pPr rtl="0"/>
             <a:fld id="{62D572E4-8572-44CF-B6FA-B15ECB2B0691}" type="datetime1">
               <a:rPr lang="it-IT" noProof="0" smtClean="0"/>
-              <a:t>09/10/2025</a:t>
+              <a:t>16/10/2025</a:t>
             </a:fld>
             <a:endParaRPr lang="it-IT" noProof="0"/>
           </a:p>
@@ -3090,7 +3094,7 @@
             <a:pPr rtl="0"/>
             <a:fld id="{5F266B29-8DDF-40ED-AC5D-ED73AC5A6521}" type="datetime1">
               <a:rPr lang="it-IT" noProof="0" smtClean="0"/>
-              <a:t>09/10/2025</a:t>
+              <a:t>16/10/2025</a:t>
             </a:fld>
             <a:endParaRPr lang="it-IT" noProof="0"/>
           </a:p>
@@ -3471,7 +3475,7 @@
             <a:pPr rtl="0"/>
             <a:fld id="{4CFC7787-2DFD-4221-B49C-354C37128239}" type="datetime1">
               <a:rPr lang="it-IT" noProof="0" smtClean="0"/>
-              <a:t>09/10/2025</a:t>
+              <a:t>16/10/2025</a:t>
             </a:fld>
             <a:endParaRPr lang="it-IT" noProof="0"/>
           </a:p>
@@ -3764,7 +3768,7 @@
             <a:pPr rtl="0"/>
             <a:fld id="{D3F07A8F-C5D3-4128-B052-E864993A59CE}" type="datetime1">
               <a:rPr lang="it-IT" noProof="0" smtClean="0"/>
-              <a:t>09/10/2025</a:t>
+              <a:t>16/10/2025</a:t>
             </a:fld>
             <a:endParaRPr lang="it-IT" noProof="0"/>
           </a:p>
@@ -3978,7 +3982,7 @@
             <a:pPr rtl="0"/>
             <a:fld id="{A36BACEF-F5E2-445B-BCCF-A68C06C41D7B}" type="datetime1">
               <a:rPr lang="it-IT" noProof="0" smtClean="0"/>
-              <a:t>09/10/2025</a:t>
+              <a:t>16/10/2025</a:t>
             </a:fld>
             <a:endParaRPr lang="it-IT" noProof="0" dirty="0"/>
           </a:p>
@@ -5099,1253 +5103,6 @@
         <p:cNvPr id="1" name="">
           <a:extLst>
             <a:ext uri="{FF2B5EF4-FFF2-40B4-BE49-F238E27FC236}">
-              <a16:creationId xmlns:a16="http://schemas.microsoft.com/office/drawing/2014/main" id="{16416149-AE97-31B2-1968-952CC849A21C}"/>
-            </a:ext>
-          </a:extLst>
-        </p:cNvPr>
-        <p:cNvGrpSpPr/>
-        <p:nvPr/>
-      </p:nvGrpSpPr>
-      <p:grpSpPr>
-        <a:xfrm>
-          <a:off x="0" y="0"/>
-          <a:ext cx="0" cy="0"/>
-          <a:chOff x="0" y="0"/>
-          <a:chExt cx="0" cy="0"/>
-        </a:xfrm>
-      </p:grpSpPr>
-      <p:sp>
-        <p:nvSpPr>
-          <p:cNvPr id="2" name="Titolo 1">
-            <a:extLst>
-              <a:ext uri="{FF2B5EF4-FFF2-40B4-BE49-F238E27FC236}">
-                <a16:creationId xmlns:a16="http://schemas.microsoft.com/office/drawing/2014/main" id="{42173830-B56E-1AE0-ACB4-690E0EF34892}"/>
-              </a:ext>
-            </a:extLst>
-          </p:cNvPr>
-          <p:cNvSpPr>
-            <a:spLocks noGrp="1"/>
-          </p:cNvSpPr>
-          <p:nvPr>
-            <p:ph type="title"/>
-          </p:nvPr>
-        </p:nvSpPr>
-        <p:spPr/>
-        <p:txBody>
-          <a:bodyPr/>
-          <a:lstStyle/>
-          <a:p>
-            <a:r>
-              <a:rPr lang="it-IT" dirty="0"/>
-              <a:t>Tipologia di sviluppo</a:t>
-            </a:r>
-          </a:p>
-        </p:txBody>
-      </p:sp>
-      <p:pic>
-        <p:nvPicPr>
-          <p:cNvPr id="2050" name="Picture 2" descr="Hybrid apps with .NET and Blazor render UI in a Web View control, where the HTML DOM interacts with Blazor and .NET of the native desktop or mobile app.">
-            <a:extLst>
-              <a:ext uri="{FF2B5EF4-FFF2-40B4-BE49-F238E27FC236}">
-                <a16:creationId xmlns:a16="http://schemas.microsoft.com/office/drawing/2014/main" id="{8B3EAF3E-5E51-CB3B-9C4C-A6474F5B343F}"/>
-              </a:ext>
-            </a:extLst>
-          </p:cNvPr>
-          <p:cNvPicPr>
-            <a:picLocks noGrp="1" noChangeAspect="1" noChangeArrowheads="1"/>
-          </p:cNvPicPr>
-          <p:nvPr>
-            <p:ph idx="1"/>
-          </p:nvPr>
-        </p:nvPicPr>
-        <p:blipFill>
-          <a:blip r:embed="rId2">
-            <a:extLst>
-              <a:ext uri="{28A0092B-C50C-407E-A947-70E740481C1C}">
-                <a14:useLocalDpi xmlns:a14="http://schemas.microsoft.com/office/drawing/2010/main" val="0"/>
-              </a:ext>
-            </a:extLst>
-          </a:blip>
-          <a:srcRect/>
-          <a:stretch>
-            <a:fillRect/>
-          </a:stretch>
-        </p:blipFill>
-        <p:spPr bwMode="auto">
-          <a:xfrm>
-            <a:off x="2521464" y="2140077"/>
-            <a:ext cx="7149072" cy="4015767"/>
-          </a:xfrm>
-          <a:prstGeom prst="rect">
-            <a:avLst/>
-          </a:prstGeom>
-          <a:noFill/>
-          <a:extLst>
-            <a:ext uri="{909E8E84-426E-40DD-AFC4-6F175D3DCCD1}">
-              <a14:hiddenFill xmlns:a14="http://schemas.microsoft.com/office/drawing/2010/main">
-                <a:solidFill>
-                  <a:srgbClr val="FFFFFF"/>
-                </a:solidFill>
-              </a14:hiddenFill>
-            </a:ext>
-          </a:extLst>
-        </p:spPr>
-      </p:pic>
-    </p:spTree>
-    <p:extLst>
-      <p:ext uri="{BB962C8B-B14F-4D97-AF65-F5344CB8AC3E}">
-        <p14:creationId xmlns:p14="http://schemas.microsoft.com/office/powerpoint/2010/main" val="1403614634"/>
-      </p:ext>
-    </p:extLst>
-  </p:cSld>
-  <p:clrMapOvr>
-    <a:masterClrMapping/>
-  </p:clrMapOvr>
-</p:sld>
-</file>
-
-<file path=ppt/slides/slide11.xml><?xml version="1.0" encoding="utf-8"?>
-<p:sld xmlns:a="http://schemas.openxmlformats.org/drawingml/2006/main" xmlns:r="http://schemas.openxmlformats.org/officeDocument/2006/relationships" xmlns:p="http://schemas.openxmlformats.org/presentationml/2006/main">
-  <p:cSld>
-    <p:spTree>
-      <p:nvGrpSpPr>
-        <p:cNvPr id="1" name="">
-          <a:extLst>
-            <a:ext uri="{FF2B5EF4-FFF2-40B4-BE49-F238E27FC236}">
-              <a16:creationId xmlns:a16="http://schemas.microsoft.com/office/drawing/2014/main" id="{D2A85660-D938-CAAD-6174-7C2A9CCCDB5E}"/>
-            </a:ext>
-          </a:extLst>
-        </p:cNvPr>
-        <p:cNvGrpSpPr/>
-        <p:nvPr/>
-      </p:nvGrpSpPr>
-      <p:grpSpPr>
-        <a:xfrm>
-          <a:off x="0" y="0"/>
-          <a:ext cx="0" cy="0"/>
-          <a:chOff x="0" y="0"/>
-          <a:chExt cx="0" cy="0"/>
-        </a:xfrm>
-      </p:grpSpPr>
-      <p:sp>
-        <p:nvSpPr>
-          <p:cNvPr id="2" name="Titolo 1">
-            <a:extLst>
-              <a:ext uri="{FF2B5EF4-FFF2-40B4-BE49-F238E27FC236}">
-                <a16:creationId xmlns:a16="http://schemas.microsoft.com/office/drawing/2014/main" id="{4E73A688-FA57-CD80-E3C6-5929223C2E14}"/>
-              </a:ext>
-            </a:extLst>
-          </p:cNvPr>
-          <p:cNvSpPr>
-            <a:spLocks noGrp="1"/>
-          </p:cNvSpPr>
-          <p:nvPr>
-            <p:ph type="title"/>
-          </p:nvPr>
-        </p:nvSpPr>
-        <p:spPr/>
-        <p:txBody>
-          <a:bodyPr/>
-          <a:lstStyle/>
-          <a:p>
-            <a:r>
-              <a:rPr lang="it-IT" dirty="0"/>
-              <a:t>Tipologia di sviluppo</a:t>
-            </a:r>
-          </a:p>
-        </p:txBody>
-      </p:sp>
-      <p:pic>
-        <p:nvPicPr>
-          <p:cNvPr id="5" name="Immagine 4">
-            <a:extLst>
-              <a:ext uri="{FF2B5EF4-FFF2-40B4-BE49-F238E27FC236}">
-                <a16:creationId xmlns:a16="http://schemas.microsoft.com/office/drawing/2014/main" id="{DBCCC1A7-3993-C823-7A71-4F9FFDADB1D7}"/>
-              </a:ext>
-            </a:extLst>
-          </p:cNvPr>
-          <p:cNvPicPr>
-            <a:picLocks noChangeAspect="1"/>
-          </p:cNvPicPr>
-          <p:nvPr/>
-        </p:nvPicPr>
-        <p:blipFill>
-          <a:blip r:embed="rId2"/>
-          <a:stretch>
-            <a:fillRect/>
-          </a:stretch>
-        </p:blipFill>
-        <p:spPr>
-          <a:xfrm>
-            <a:off x="1975861" y="1990539"/>
-            <a:ext cx="8240275" cy="4058216"/>
-          </a:xfrm>
-          <a:prstGeom prst="rect">
-            <a:avLst/>
-          </a:prstGeom>
-        </p:spPr>
-      </p:pic>
-    </p:spTree>
-    <p:extLst>
-      <p:ext uri="{BB962C8B-B14F-4D97-AF65-F5344CB8AC3E}">
-        <p14:creationId xmlns:p14="http://schemas.microsoft.com/office/powerpoint/2010/main" val="407018278"/>
-      </p:ext>
-    </p:extLst>
-  </p:cSld>
-  <p:clrMapOvr>
-    <a:masterClrMapping/>
-  </p:clrMapOvr>
-</p:sld>
-</file>
-
-<file path=ppt/slides/slide12.xml><?xml version="1.0" encoding="utf-8"?>
-<p:sld xmlns:a="http://schemas.openxmlformats.org/drawingml/2006/main" xmlns:r="http://schemas.openxmlformats.org/officeDocument/2006/relationships" xmlns:p="http://schemas.openxmlformats.org/presentationml/2006/main">
-  <p:cSld>
-    <p:spTree>
-      <p:nvGrpSpPr>
-        <p:cNvPr id="1" name="">
-          <a:extLst>
-            <a:ext uri="{FF2B5EF4-FFF2-40B4-BE49-F238E27FC236}">
-              <a16:creationId xmlns:a16="http://schemas.microsoft.com/office/drawing/2014/main" id="{C22E4A5B-D433-43F8-7596-271436EBBF81}"/>
-            </a:ext>
-          </a:extLst>
-        </p:cNvPr>
-        <p:cNvGrpSpPr/>
-        <p:nvPr/>
-      </p:nvGrpSpPr>
-      <p:grpSpPr>
-        <a:xfrm>
-          <a:off x="0" y="0"/>
-          <a:ext cx="0" cy="0"/>
-          <a:chOff x="0" y="0"/>
-          <a:chExt cx="0" cy="0"/>
-        </a:xfrm>
-      </p:grpSpPr>
-      <p:sp>
-        <p:nvSpPr>
-          <p:cNvPr id="2" name="Titolo 1">
-            <a:extLst>
-              <a:ext uri="{FF2B5EF4-FFF2-40B4-BE49-F238E27FC236}">
-                <a16:creationId xmlns:a16="http://schemas.microsoft.com/office/drawing/2014/main" id="{9458D717-DFAA-9429-D83D-6A84946A38F3}"/>
-              </a:ext>
-            </a:extLst>
-          </p:cNvPr>
-          <p:cNvSpPr>
-            <a:spLocks noGrp="1"/>
-          </p:cNvSpPr>
-          <p:nvPr>
-            <p:ph type="title"/>
-          </p:nvPr>
-        </p:nvSpPr>
-        <p:spPr/>
-        <p:txBody>
-          <a:bodyPr/>
-          <a:lstStyle/>
-          <a:p>
-            <a:r>
-              <a:rPr lang="it-IT" dirty="0"/>
-              <a:t>introduzione</a:t>
-            </a:r>
-          </a:p>
-        </p:txBody>
-      </p:sp>
-      <p:sp>
-        <p:nvSpPr>
-          <p:cNvPr id="3" name="Segnaposto contenuto 2">
-            <a:extLst>
-              <a:ext uri="{FF2B5EF4-FFF2-40B4-BE49-F238E27FC236}">
-                <a16:creationId xmlns:a16="http://schemas.microsoft.com/office/drawing/2014/main" id="{D0E0046F-E3B4-0DCA-490F-4D1A361C00AD}"/>
-              </a:ext>
-            </a:extLst>
-          </p:cNvPr>
-          <p:cNvSpPr>
-            <a:spLocks noGrp="1"/>
-          </p:cNvSpPr>
-          <p:nvPr>
-            <p:ph idx="1"/>
-          </p:nvPr>
-        </p:nvSpPr>
-        <p:spPr/>
-        <p:txBody>
-          <a:bodyPr>
-            <a:normAutofit/>
-          </a:bodyPr>
-          <a:lstStyle/>
-          <a:p>
-            <a:pPr marL="0" indent="0" algn="ctr">
-              <a:buNone/>
-            </a:pPr>
-            <a:r>
-              <a:rPr lang="it-IT" sz="6000" dirty="0"/>
-              <a:t>Struttura del progetto</a:t>
-            </a:r>
-          </a:p>
-        </p:txBody>
-      </p:sp>
-    </p:spTree>
-    <p:extLst>
-      <p:ext uri="{BB962C8B-B14F-4D97-AF65-F5344CB8AC3E}">
-        <p14:creationId xmlns:p14="http://schemas.microsoft.com/office/powerpoint/2010/main" val="823252870"/>
-      </p:ext>
-    </p:extLst>
-  </p:cSld>
-  <p:clrMapOvr>
-    <a:masterClrMapping/>
-  </p:clrMapOvr>
-</p:sld>
-</file>
-
-<file path=ppt/slides/slide13.xml><?xml version="1.0" encoding="utf-8"?>
-<p:sld xmlns:a="http://schemas.openxmlformats.org/drawingml/2006/main" xmlns:r="http://schemas.openxmlformats.org/officeDocument/2006/relationships" xmlns:p="http://schemas.openxmlformats.org/presentationml/2006/main">
-  <p:cSld>
-    <p:spTree>
-      <p:nvGrpSpPr>
-        <p:cNvPr id="1" name="">
-          <a:extLst>
-            <a:ext uri="{FF2B5EF4-FFF2-40B4-BE49-F238E27FC236}">
-              <a16:creationId xmlns:a16="http://schemas.microsoft.com/office/drawing/2014/main" id="{354A9DD8-F1DC-3496-DC42-F2A547402E19}"/>
-            </a:ext>
-          </a:extLst>
-        </p:cNvPr>
-        <p:cNvGrpSpPr/>
-        <p:nvPr/>
-      </p:nvGrpSpPr>
-      <p:grpSpPr>
-        <a:xfrm>
-          <a:off x="0" y="0"/>
-          <a:ext cx="0" cy="0"/>
-          <a:chOff x="0" y="0"/>
-          <a:chExt cx="0" cy="0"/>
-        </a:xfrm>
-      </p:grpSpPr>
-      <p:sp>
-        <p:nvSpPr>
-          <p:cNvPr id="2" name="Titolo 1">
-            <a:extLst>
-              <a:ext uri="{FF2B5EF4-FFF2-40B4-BE49-F238E27FC236}">
-                <a16:creationId xmlns:a16="http://schemas.microsoft.com/office/drawing/2014/main" id="{DB4C04BE-BB21-E1A0-9480-E5C631F46FFE}"/>
-              </a:ext>
-            </a:extLst>
-          </p:cNvPr>
-          <p:cNvSpPr>
-            <a:spLocks noGrp="1"/>
-          </p:cNvSpPr>
-          <p:nvPr>
-            <p:ph type="title"/>
-          </p:nvPr>
-        </p:nvSpPr>
-        <p:spPr/>
-        <p:txBody>
-          <a:bodyPr/>
-          <a:lstStyle/>
-          <a:p>
-            <a:r>
-              <a:rPr lang="it-IT" dirty="0"/>
-              <a:t>Componenti</a:t>
-            </a:r>
-          </a:p>
-        </p:txBody>
-      </p:sp>
-      <p:sp>
-        <p:nvSpPr>
-          <p:cNvPr id="3" name="Segnaposto contenuto 2">
-            <a:extLst>
-              <a:ext uri="{FF2B5EF4-FFF2-40B4-BE49-F238E27FC236}">
-                <a16:creationId xmlns:a16="http://schemas.microsoft.com/office/drawing/2014/main" id="{FEB54766-180C-BC63-6AD3-BED3C0AAAC9D}"/>
-              </a:ext>
-            </a:extLst>
-          </p:cNvPr>
-          <p:cNvSpPr>
-            <a:spLocks noGrp="1"/>
-          </p:cNvSpPr>
-          <p:nvPr>
-            <p:ph idx="1"/>
-          </p:nvPr>
-        </p:nvSpPr>
-        <p:spPr/>
-        <p:txBody>
-          <a:bodyPr>
-            <a:normAutofit/>
-          </a:bodyPr>
-          <a:lstStyle/>
-          <a:p>
-            <a:pPr marL="0" indent="0" algn="ctr">
-              <a:buNone/>
-            </a:pPr>
-            <a:r>
-              <a:rPr lang="it-IT" sz="1800" dirty="0">
-                <a:solidFill>
-                  <a:srgbClr val="3D3D3D"/>
-                </a:solidFill>
-                <a:effectLst/>
-                <a:latin typeface="Gill Sans MT" panose="020B0502020104020203" pitchFamily="34" charset="0"/>
-              </a:rPr>
-              <a:t>Un componente è un elemento dell'interfaccia utente, come una pagina, una finestra di dialogo o un modulo di inserimento dati. I componenti sono classi .NET C# incorporati in assembly .NET.</a:t>
-            </a:r>
-            <a:endParaRPr lang="it-IT" dirty="0"/>
-          </a:p>
-        </p:txBody>
-      </p:sp>
-    </p:spTree>
-    <p:extLst>
-      <p:ext uri="{BB962C8B-B14F-4D97-AF65-F5344CB8AC3E}">
-        <p14:creationId xmlns:p14="http://schemas.microsoft.com/office/powerpoint/2010/main" val="3294199067"/>
-      </p:ext>
-    </p:extLst>
-  </p:cSld>
-  <p:clrMapOvr>
-    <a:masterClrMapping/>
-  </p:clrMapOvr>
-</p:sld>
-</file>
-
-<file path=ppt/slides/slide14.xml><?xml version="1.0" encoding="utf-8"?>
-<p:sld xmlns:a="http://schemas.openxmlformats.org/drawingml/2006/main" xmlns:r="http://schemas.openxmlformats.org/officeDocument/2006/relationships" xmlns:p="http://schemas.openxmlformats.org/presentationml/2006/main">
-  <p:cSld>
-    <p:spTree>
-      <p:nvGrpSpPr>
-        <p:cNvPr id="1" name="">
-          <a:extLst>
-            <a:ext uri="{FF2B5EF4-FFF2-40B4-BE49-F238E27FC236}">
-              <a16:creationId xmlns:a16="http://schemas.microsoft.com/office/drawing/2014/main" id="{05BC3AA0-3BF0-7D29-A7DE-FDE9602373BB}"/>
-            </a:ext>
-          </a:extLst>
-        </p:cNvPr>
-        <p:cNvGrpSpPr/>
-        <p:nvPr/>
-      </p:nvGrpSpPr>
-      <p:grpSpPr>
-        <a:xfrm>
-          <a:off x="0" y="0"/>
-          <a:ext cx="0" cy="0"/>
-          <a:chOff x="0" y="0"/>
-          <a:chExt cx="0" cy="0"/>
-        </a:xfrm>
-      </p:grpSpPr>
-      <p:sp>
-        <p:nvSpPr>
-          <p:cNvPr id="2" name="Titolo 1">
-            <a:extLst>
-              <a:ext uri="{FF2B5EF4-FFF2-40B4-BE49-F238E27FC236}">
-                <a16:creationId xmlns:a16="http://schemas.microsoft.com/office/drawing/2014/main" id="{941D7D17-8F42-2869-D677-CC257E1B352F}"/>
-              </a:ext>
-            </a:extLst>
-          </p:cNvPr>
-          <p:cNvSpPr>
-            <a:spLocks noGrp="1"/>
-          </p:cNvSpPr>
-          <p:nvPr>
-            <p:ph type="title"/>
-          </p:nvPr>
-        </p:nvSpPr>
-        <p:spPr/>
-        <p:txBody>
-          <a:bodyPr/>
-          <a:lstStyle/>
-          <a:p>
-            <a:r>
-              <a:rPr lang="it-IT" dirty="0"/>
-              <a:t>Componenti</a:t>
-            </a:r>
-          </a:p>
-        </p:txBody>
-      </p:sp>
-      <p:pic>
-        <p:nvPicPr>
-          <p:cNvPr id="3078" name="Picture 6">
-            <a:extLst>
-              <a:ext uri="{FF2B5EF4-FFF2-40B4-BE49-F238E27FC236}">
-                <a16:creationId xmlns:a16="http://schemas.microsoft.com/office/drawing/2014/main" id="{F4D6339B-542D-6E6F-9153-0A430A650A42}"/>
-              </a:ext>
-            </a:extLst>
-          </p:cNvPr>
-          <p:cNvPicPr>
-            <a:picLocks noGrp="1" noChangeAspect="1" noChangeArrowheads="1"/>
-          </p:cNvPicPr>
-          <p:nvPr>
-            <p:ph idx="1"/>
-          </p:nvPr>
-        </p:nvPicPr>
-        <p:blipFill>
-          <a:blip r:embed="rId2">
-            <a:extLst>
-              <a:ext uri="{28A0092B-C50C-407E-A947-70E740481C1C}">
-                <a14:useLocalDpi xmlns:a14="http://schemas.microsoft.com/office/drawing/2010/main" val="0"/>
-              </a:ext>
-            </a:extLst>
-          </a:blip>
-          <a:stretch>
-            <a:fillRect/>
-          </a:stretch>
-        </p:blipFill>
-        <p:spPr bwMode="auto">
-          <a:xfrm>
-            <a:off x="3735977" y="828595"/>
-            <a:ext cx="4313341" cy="5833462"/>
-          </a:xfrm>
-          <a:prstGeom prst="rect">
-            <a:avLst/>
-          </a:prstGeom>
-          <a:noFill/>
-          <a:extLst>
-            <a:ext uri="{909E8E84-426E-40DD-AFC4-6F175D3DCCD1}">
-              <a14:hiddenFill xmlns:a14="http://schemas.microsoft.com/office/drawing/2010/main">
-                <a:solidFill>
-                  <a:srgbClr val="FFFFFF"/>
-                </a:solidFill>
-              </a14:hiddenFill>
-            </a:ext>
-          </a:extLst>
-        </p:spPr>
-      </p:pic>
-    </p:spTree>
-    <p:extLst>
-      <p:ext uri="{BB962C8B-B14F-4D97-AF65-F5344CB8AC3E}">
-        <p14:creationId xmlns:p14="http://schemas.microsoft.com/office/powerpoint/2010/main" val="4054004873"/>
-      </p:ext>
-    </p:extLst>
-  </p:cSld>
-  <p:clrMapOvr>
-    <a:masterClrMapping/>
-  </p:clrMapOvr>
-</p:sld>
-</file>
-
-<file path=ppt/slides/slide2.xml><?xml version="1.0" encoding="utf-8"?>
-<p:sld xmlns:a="http://schemas.openxmlformats.org/drawingml/2006/main" xmlns:r="http://schemas.openxmlformats.org/officeDocument/2006/relationships" xmlns:p="http://schemas.openxmlformats.org/presentationml/2006/main">
-  <p:cSld>
-    <p:spTree>
-      <p:nvGrpSpPr>
-        <p:cNvPr id="1" name=""/>
-        <p:cNvGrpSpPr/>
-        <p:nvPr/>
-      </p:nvGrpSpPr>
-      <p:grpSpPr>
-        <a:xfrm>
-          <a:off x="0" y="0"/>
-          <a:ext cx="0" cy="0"/>
-          <a:chOff x="0" y="0"/>
-          <a:chExt cx="0" cy="0"/>
-        </a:xfrm>
-      </p:grpSpPr>
-      <p:sp>
-        <p:nvSpPr>
-          <p:cNvPr id="2" name="Titolo 1">
-            <a:extLst>
-              <a:ext uri="{FF2B5EF4-FFF2-40B4-BE49-F238E27FC236}">
-                <a16:creationId xmlns:a16="http://schemas.microsoft.com/office/drawing/2014/main" id="{319E2CBA-C315-45C2-34CE-15F8E613D5FF}"/>
-              </a:ext>
-            </a:extLst>
-          </p:cNvPr>
-          <p:cNvSpPr>
-            <a:spLocks noGrp="1"/>
-          </p:cNvSpPr>
-          <p:nvPr>
-            <p:ph type="title"/>
-          </p:nvPr>
-        </p:nvSpPr>
-        <p:spPr/>
-        <p:txBody>
-          <a:bodyPr/>
-          <a:lstStyle/>
-          <a:p>
-            <a:r>
-              <a:rPr lang="it-IT" dirty="0"/>
-              <a:t>Programma Giorno 1</a:t>
-            </a:r>
-          </a:p>
-        </p:txBody>
-      </p:sp>
-      <p:sp>
-        <p:nvSpPr>
-          <p:cNvPr id="3" name="Segnaposto contenuto 2">
-            <a:extLst>
-              <a:ext uri="{FF2B5EF4-FFF2-40B4-BE49-F238E27FC236}">
-                <a16:creationId xmlns:a16="http://schemas.microsoft.com/office/drawing/2014/main" id="{3F20750C-BAA5-AA53-4645-FB3E88740FA8}"/>
-              </a:ext>
-            </a:extLst>
-          </p:cNvPr>
-          <p:cNvSpPr>
-            <a:spLocks noGrp="1"/>
-          </p:cNvSpPr>
-          <p:nvPr>
-            <p:ph idx="1"/>
-          </p:nvPr>
-        </p:nvSpPr>
-        <p:spPr/>
-        <p:txBody>
-          <a:bodyPr/>
-          <a:lstStyle/>
-          <a:p>
-            <a:r>
-              <a:rPr lang="it-IT" dirty="0"/>
-              <a:t>Introduzione Html e </a:t>
-            </a:r>
-            <a:r>
-              <a:rPr lang="it-IT" dirty="0" err="1"/>
-              <a:t>Javascript</a:t>
-            </a:r>
-            <a:endParaRPr lang="it-IT" dirty="0"/>
-          </a:p>
-          <a:p>
-            <a:r>
-              <a:rPr lang="it-IT" dirty="0"/>
-              <a:t>Panoramica su </a:t>
-            </a:r>
-            <a:r>
-              <a:rPr lang="it-IT" dirty="0" err="1"/>
-              <a:t>Blazor</a:t>
-            </a:r>
-            <a:r>
-              <a:rPr lang="it-IT" dirty="0"/>
-              <a:t> (Server vs </a:t>
-            </a:r>
-            <a:r>
-              <a:rPr lang="it-IT" dirty="0" err="1"/>
-              <a:t>WebAssembly</a:t>
-            </a:r>
-            <a:r>
-              <a:rPr lang="it-IT" dirty="0"/>
-              <a:t>)</a:t>
-            </a:r>
-          </a:p>
-          <a:p>
-            <a:r>
-              <a:rPr lang="it-IT" dirty="0" err="1"/>
-              <a:t>Razor</a:t>
-            </a:r>
-            <a:r>
-              <a:rPr lang="it-IT" dirty="0"/>
-              <a:t> e componenti base</a:t>
-            </a:r>
-          </a:p>
-          <a:p>
-            <a:r>
-              <a:rPr lang="it-IT" dirty="0"/>
-              <a:t>Ciclo di vita componenti e gestione eventi</a:t>
-            </a:r>
-          </a:p>
-        </p:txBody>
-      </p:sp>
-    </p:spTree>
-    <p:extLst>
-      <p:ext uri="{BB962C8B-B14F-4D97-AF65-F5344CB8AC3E}">
-        <p14:creationId xmlns:p14="http://schemas.microsoft.com/office/powerpoint/2010/main" val="1488116006"/>
-      </p:ext>
-    </p:extLst>
-  </p:cSld>
-  <p:clrMapOvr>
-    <a:masterClrMapping/>
-  </p:clrMapOvr>
-</p:sld>
-</file>
-
-<file path=ppt/slides/slide3.xml><?xml version="1.0" encoding="utf-8"?>
-<p:sld xmlns:a="http://schemas.openxmlformats.org/drawingml/2006/main" xmlns:r="http://schemas.openxmlformats.org/officeDocument/2006/relationships" xmlns:p="http://schemas.openxmlformats.org/presentationml/2006/main">
-  <p:cSld>
-    <p:spTree>
-      <p:nvGrpSpPr>
-        <p:cNvPr id="1" name="">
-          <a:extLst>
-            <a:ext uri="{FF2B5EF4-FFF2-40B4-BE49-F238E27FC236}">
-              <a16:creationId xmlns:a16="http://schemas.microsoft.com/office/drawing/2014/main" id="{30128656-ABCD-BC43-4749-47D045D3A001}"/>
-            </a:ext>
-          </a:extLst>
-        </p:cNvPr>
-        <p:cNvGrpSpPr/>
-        <p:nvPr/>
-      </p:nvGrpSpPr>
-      <p:grpSpPr>
-        <a:xfrm>
-          <a:off x="0" y="0"/>
-          <a:ext cx="0" cy="0"/>
-          <a:chOff x="0" y="0"/>
-          <a:chExt cx="0" cy="0"/>
-        </a:xfrm>
-      </p:grpSpPr>
-      <p:sp>
-        <p:nvSpPr>
-          <p:cNvPr id="2" name="Titolo 1">
-            <a:extLst>
-              <a:ext uri="{FF2B5EF4-FFF2-40B4-BE49-F238E27FC236}">
-                <a16:creationId xmlns:a16="http://schemas.microsoft.com/office/drawing/2014/main" id="{772BE159-96B3-F5A7-73C3-AA1968F4F44F}"/>
-              </a:ext>
-            </a:extLst>
-          </p:cNvPr>
-          <p:cNvSpPr>
-            <a:spLocks noGrp="1"/>
-          </p:cNvSpPr>
-          <p:nvPr>
-            <p:ph type="title"/>
-          </p:nvPr>
-        </p:nvSpPr>
-        <p:spPr/>
-        <p:txBody>
-          <a:bodyPr/>
-          <a:lstStyle/>
-          <a:p>
-            <a:r>
-              <a:rPr lang="it-IT" dirty="0"/>
-              <a:t>Programma Giorno 2</a:t>
-            </a:r>
-          </a:p>
-        </p:txBody>
-      </p:sp>
-      <p:sp>
-        <p:nvSpPr>
-          <p:cNvPr id="3" name="Segnaposto contenuto 2">
-            <a:extLst>
-              <a:ext uri="{FF2B5EF4-FFF2-40B4-BE49-F238E27FC236}">
-                <a16:creationId xmlns:a16="http://schemas.microsoft.com/office/drawing/2014/main" id="{4803E75C-6D3B-21B8-2145-C2C12FF5321C}"/>
-              </a:ext>
-            </a:extLst>
-          </p:cNvPr>
-          <p:cNvSpPr>
-            <a:spLocks noGrp="1"/>
-          </p:cNvSpPr>
-          <p:nvPr>
-            <p:ph idx="1"/>
-          </p:nvPr>
-        </p:nvSpPr>
-        <p:spPr/>
-        <p:txBody>
-          <a:bodyPr/>
-          <a:lstStyle/>
-          <a:p>
-            <a:r>
-              <a:rPr lang="it-IT" dirty="0"/>
-              <a:t>Api </a:t>
-            </a:r>
-            <a:r>
-              <a:rPr lang="it-IT" dirty="0" err="1"/>
-              <a:t>rest</a:t>
-            </a:r>
-            <a:r>
-              <a:rPr lang="it-IT" dirty="0"/>
-              <a:t> con </a:t>
-            </a:r>
-            <a:r>
-              <a:rPr lang="it-IT" dirty="0" err="1"/>
-              <a:t>HttpClient</a:t>
-            </a:r>
-            <a:endParaRPr lang="it-IT" dirty="0"/>
-          </a:p>
-          <a:p>
-            <a:r>
-              <a:rPr lang="it-IT" dirty="0" err="1"/>
-              <a:t>Dependency</a:t>
-            </a:r>
-            <a:r>
-              <a:rPr lang="it-IT" dirty="0"/>
-              <a:t> Injection</a:t>
-            </a:r>
-          </a:p>
-          <a:p>
-            <a:r>
-              <a:rPr lang="it-IT" dirty="0"/>
-              <a:t>Stato (</a:t>
-            </a:r>
-            <a:r>
-              <a:rPr lang="it-IT" dirty="0" err="1"/>
-              <a:t>sessionStorage</a:t>
-            </a:r>
-            <a:r>
-              <a:rPr lang="it-IT" dirty="0"/>
-              <a:t>/</a:t>
-            </a:r>
-            <a:r>
-              <a:rPr lang="it-IT" dirty="0" err="1"/>
-              <a:t>localStorage</a:t>
-            </a:r>
-            <a:r>
-              <a:rPr lang="it-IT" dirty="0"/>
-              <a:t>)</a:t>
-            </a:r>
-          </a:p>
-          <a:p>
-            <a:r>
-              <a:rPr lang="it-IT" dirty="0"/>
-              <a:t>Implementazione </a:t>
-            </a:r>
-            <a:r>
-              <a:rPr lang="it-IT" dirty="0" err="1"/>
-              <a:t>SignalR</a:t>
-            </a:r>
-            <a:endParaRPr lang="it-IT" dirty="0"/>
-          </a:p>
-        </p:txBody>
-      </p:sp>
-    </p:spTree>
-    <p:extLst>
-      <p:ext uri="{BB962C8B-B14F-4D97-AF65-F5344CB8AC3E}">
-        <p14:creationId xmlns:p14="http://schemas.microsoft.com/office/powerpoint/2010/main" val="766020423"/>
-      </p:ext>
-    </p:extLst>
-  </p:cSld>
-  <p:clrMapOvr>
-    <a:masterClrMapping/>
-  </p:clrMapOvr>
-</p:sld>
-</file>
-
-<file path=ppt/slides/slide4.xml><?xml version="1.0" encoding="utf-8"?>
-<p:sld xmlns:a="http://schemas.openxmlformats.org/drawingml/2006/main" xmlns:r="http://schemas.openxmlformats.org/officeDocument/2006/relationships" xmlns:p="http://schemas.openxmlformats.org/presentationml/2006/main">
-  <p:cSld>
-    <p:spTree>
-      <p:nvGrpSpPr>
-        <p:cNvPr id="1" name="">
-          <a:extLst>
-            <a:ext uri="{FF2B5EF4-FFF2-40B4-BE49-F238E27FC236}">
-              <a16:creationId xmlns:a16="http://schemas.microsoft.com/office/drawing/2014/main" id="{A2D35616-2F3B-AA8F-7263-3CEA683909B1}"/>
-            </a:ext>
-          </a:extLst>
-        </p:cNvPr>
-        <p:cNvGrpSpPr/>
-        <p:nvPr/>
-      </p:nvGrpSpPr>
-      <p:grpSpPr>
-        <a:xfrm>
-          <a:off x="0" y="0"/>
-          <a:ext cx="0" cy="0"/>
-          <a:chOff x="0" y="0"/>
-          <a:chExt cx="0" cy="0"/>
-        </a:xfrm>
-      </p:grpSpPr>
-      <p:sp>
-        <p:nvSpPr>
-          <p:cNvPr id="2" name="Titolo 1">
-            <a:extLst>
-              <a:ext uri="{FF2B5EF4-FFF2-40B4-BE49-F238E27FC236}">
-                <a16:creationId xmlns:a16="http://schemas.microsoft.com/office/drawing/2014/main" id="{97CF0F3A-78CF-DDA1-6A13-C0E75A3EC53C}"/>
-              </a:ext>
-            </a:extLst>
-          </p:cNvPr>
-          <p:cNvSpPr>
-            <a:spLocks noGrp="1"/>
-          </p:cNvSpPr>
-          <p:nvPr>
-            <p:ph type="title"/>
-          </p:nvPr>
-        </p:nvSpPr>
-        <p:spPr/>
-        <p:txBody>
-          <a:bodyPr/>
-          <a:lstStyle/>
-          <a:p>
-            <a:r>
-              <a:rPr lang="it-IT" dirty="0"/>
-              <a:t>Programma giorno 3</a:t>
-            </a:r>
-          </a:p>
-        </p:txBody>
-      </p:sp>
-      <p:sp>
-        <p:nvSpPr>
-          <p:cNvPr id="3" name="Segnaposto contenuto 2">
-            <a:extLst>
-              <a:ext uri="{FF2B5EF4-FFF2-40B4-BE49-F238E27FC236}">
-                <a16:creationId xmlns:a16="http://schemas.microsoft.com/office/drawing/2014/main" id="{E34DA367-8093-223A-25DE-595E3B6D4D72}"/>
-              </a:ext>
-            </a:extLst>
-          </p:cNvPr>
-          <p:cNvSpPr>
-            <a:spLocks noGrp="1"/>
-          </p:cNvSpPr>
-          <p:nvPr>
-            <p:ph idx="1"/>
-          </p:nvPr>
-        </p:nvSpPr>
-        <p:spPr/>
-        <p:txBody>
-          <a:bodyPr/>
-          <a:lstStyle/>
-          <a:p>
-            <a:r>
-              <a:rPr lang="it-IT" dirty="0"/>
-              <a:t>Utilizzo di HTML e CSS in </a:t>
-            </a:r>
-            <a:r>
-              <a:rPr lang="it-IT" dirty="0" err="1"/>
-              <a:t>blazor</a:t>
-            </a:r>
-            <a:r>
-              <a:rPr lang="it-IT" dirty="0"/>
-              <a:t> per lo styling</a:t>
-            </a:r>
-          </a:p>
-          <a:p>
-            <a:r>
-              <a:rPr lang="it-IT" dirty="0"/>
-              <a:t>Librerie di componenti</a:t>
-            </a:r>
-          </a:p>
-          <a:p>
-            <a:r>
-              <a:rPr lang="it-IT" dirty="0"/>
-              <a:t>Esercizi pratici</a:t>
-            </a:r>
-          </a:p>
-        </p:txBody>
-      </p:sp>
-    </p:spTree>
-    <p:extLst>
-      <p:ext uri="{BB962C8B-B14F-4D97-AF65-F5344CB8AC3E}">
-        <p14:creationId xmlns:p14="http://schemas.microsoft.com/office/powerpoint/2010/main" val="1502349550"/>
-      </p:ext>
-    </p:extLst>
-  </p:cSld>
-  <p:clrMapOvr>
-    <a:masterClrMapping/>
-  </p:clrMapOvr>
-</p:sld>
-</file>
-
-<file path=ppt/slides/slide5.xml><?xml version="1.0" encoding="utf-8"?>
-<p:sld xmlns:a="http://schemas.openxmlformats.org/drawingml/2006/main" xmlns:r="http://schemas.openxmlformats.org/officeDocument/2006/relationships" xmlns:p="http://schemas.openxmlformats.org/presentationml/2006/main">
-  <p:cSld>
-    <p:spTree>
-      <p:nvGrpSpPr>
-        <p:cNvPr id="1" name="">
-          <a:extLst>
-            <a:ext uri="{FF2B5EF4-FFF2-40B4-BE49-F238E27FC236}">
-              <a16:creationId xmlns:a16="http://schemas.microsoft.com/office/drawing/2014/main" id="{448098F0-C21C-5D9C-D2A8-269B82CC068D}"/>
-            </a:ext>
-          </a:extLst>
-        </p:cNvPr>
-        <p:cNvGrpSpPr/>
-        <p:nvPr/>
-      </p:nvGrpSpPr>
-      <p:grpSpPr>
-        <a:xfrm>
-          <a:off x="0" y="0"/>
-          <a:ext cx="0" cy="0"/>
-          <a:chOff x="0" y="0"/>
-          <a:chExt cx="0" cy="0"/>
-        </a:xfrm>
-      </p:grpSpPr>
-      <p:sp>
-        <p:nvSpPr>
-          <p:cNvPr id="2" name="Titolo 1">
-            <a:extLst>
-              <a:ext uri="{FF2B5EF4-FFF2-40B4-BE49-F238E27FC236}">
-                <a16:creationId xmlns:a16="http://schemas.microsoft.com/office/drawing/2014/main" id="{44832A39-D223-310C-393D-9BB960073BAB}"/>
-              </a:ext>
-            </a:extLst>
-          </p:cNvPr>
-          <p:cNvSpPr>
-            <a:spLocks noGrp="1"/>
-          </p:cNvSpPr>
-          <p:nvPr>
-            <p:ph type="title"/>
-          </p:nvPr>
-        </p:nvSpPr>
-        <p:spPr/>
-        <p:txBody>
-          <a:bodyPr/>
-          <a:lstStyle/>
-          <a:p>
-            <a:r>
-              <a:rPr lang="it-IT" dirty="0"/>
-              <a:t>Programma giorno 4</a:t>
-            </a:r>
-          </a:p>
-        </p:txBody>
-      </p:sp>
-      <p:sp>
-        <p:nvSpPr>
-          <p:cNvPr id="3" name="Segnaposto contenuto 2">
-            <a:extLst>
-              <a:ext uri="{FF2B5EF4-FFF2-40B4-BE49-F238E27FC236}">
-                <a16:creationId xmlns:a16="http://schemas.microsoft.com/office/drawing/2014/main" id="{7B17C3E2-FEFF-08A5-E7A3-104CE018326C}"/>
-              </a:ext>
-            </a:extLst>
-          </p:cNvPr>
-          <p:cNvSpPr>
-            <a:spLocks noGrp="1"/>
-          </p:cNvSpPr>
-          <p:nvPr>
-            <p:ph idx="1"/>
-          </p:nvPr>
-        </p:nvSpPr>
-        <p:spPr/>
-        <p:txBody>
-          <a:bodyPr/>
-          <a:lstStyle/>
-          <a:p>
-            <a:r>
-              <a:rPr lang="it-IT" dirty="0"/>
-              <a:t>Approfondimenti ed esercitazioni</a:t>
-            </a:r>
-          </a:p>
-        </p:txBody>
-      </p:sp>
-    </p:spTree>
-    <p:extLst>
-      <p:ext uri="{BB962C8B-B14F-4D97-AF65-F5344CB8AC3E}">
-        <p14:creationId xmlns:p14="http://schemas.microsoft.com/office/powerpoint/2010/main" val="206916150"/>
-      </p:ext>
-    </p:extLst>
-  </p:cSld>
-  <p:clrMapOvr>
-    <a:masterClrMapping/>
-  </p:clrMapOvr>
-</p:sld>
-</file>
-
-<file path=ppt/slides/slide6.xml><?xml version="1.0" encoding="utf-8"?>
-<p:sld xmlns:a="http://schemas.openxmlformats.org/drawingml/2006/main" xmlns:r="http://schemas.openxmlformats.org/officeDocument/2006/relationships" xmlns:p="http://schemas.openxmlformats.org/presentationml/2006/main">
-  <p:cSld>
-    <p:spTree>
-      <p:nvGrpSpPr>
-        <p:cNvPr id="1" name="">
-          <a:extLst>
-            <a:ext uri="{FF2B5EF4-FFF2-40B4-BE49-F238E27FC236}">
-              <a16:creationId xmlns:a16="http://schemas.microsoft.com/office/drawing/2014/main" id="{05B8572D-8674-0A1F-6650-4B55475C3861}"/>
-            </a:ext>
-          </a:extLst>
-        </p:cNvPr>
-        <p:cNvGrpSpPr/>
-        <p:nvPr/>
-      </p:nvGrpSpPr>
-      <p:grpSpPr>
-        <a:xfrm>
-          <a:off x="0" y="0"/>
-          <a:ext cx="0" cy="0"/>
-          <a:chOff x="0" y="0"/>
-          <a:chExt cx="0" cy="0"/>
-        </a:xfrm>
-      </p:grpSpPr>
-      <p:sp>
-        <p:nvSpPr>
-          <p:cNvPr id="2" name="Titolo 1">
-            <a:extLst>
-              <a:ext uri="{FF2B5EF4-FFF2-40B4-BE49-F238E27FC236}">
-                <a16:creationId xmlns:a16="http://schemas.microsoft.com/office/drawing/2014/main" id="{18AB9C9D-14E6-DD49-AF91-9999749C8662}"/>
-              </a:ext>
-            </a:extLst>
-          </p:cNvPr>
-          <p:cNvSpPr>
-            <a:spLocks noGrp="1"/>
-          </p:cNvSpPr>
-          <p:nvPr>
-            <p:ph type="title"/>
-          </p:nvPr>
-        </p:nvSpPr>
-        <p:spPr/>
-        <p:txBody>
-          <a:bodyPr/>
-          <a:lstStyle/>
-          <a:p>
-            <a:r>
-              <a:rPr lang="en-US" b="1" dirty="0"/>
-              <a:t>HTML</a:t>
-            </a:r>
-            <a:endParaRPr lang="it-IT" dirty="0"/>
-          </a:p>
-        </p:txBody>
-      </p:sp>
-      <p:pic>
-        <p:nvPicPr>
-          <p:cNvPr id="7" name="Segnaposto contenuto 6">
-            <a:extLst>
-              <a:ext uri="{FF2B5EF4-FFF2-40B4-BE49-F238E27FC236}">
-                <a16:creationId xmlns:a16="http://schemas.microsoft.com/office/drawing/2014/main" id="{FEB49A69-7066-A9C3-1EC7-0751140ACDFB}"/>
-              </a:ext>
-            </a:extLst>
-          </p:cNvPr>
-          <p:cNvPicPr>
-            <a:picLocks noGrp="1" noChangeAspect="1"/>
-          </p:cNvPicPr>
-          <p:nvPr>
-            <p:ph sz="half" idx="2"/>
-          </p:nvPr>
-        </p:nvPicPr>
-        <p:blipFill>
-          <a:blip r:embed="rId2"/>
-          <a:stretch>
-            <a:fillRect/>
-          </a:stretch>
-        </p:blipFill>
-        <p:spPr>
-          <a:xfrm>
-            <a:off x="6188075" y="2733748"/>
-            <a:ext cx="5422900" cy="2620816"/>
-          </a:xfrm>
-          <a:prstGeom prst="rect">
-            <a:avLst/>
-          </a:prstGeom>
-        </p:spPr>
-      </p:pic>
-      <p:sp>
-        <p:nvSpPr>
-          <p:cNvPr id="5" name="Segnaposto contenuto 4">
-            <a:extLst>
-              <a:ext uri="{FF2B5EF4-FFF2-40B4-BE49-F238E27FC236}">
-                <a16:creationId xmlns:a16="http://schemas.microsoft.com/office/drawing/2014/main" id="{717F48EC-62E2-6A75-FEC4-C507C35E69B3}"/>
-              </a:ext>
-            </a:extLst>
-          </p:cNvPr>
-          <p:cNvSpPr>
-            <a:spLocks noGrp="1"/>
-          </p:cNvSpPr>
-          <p:nvPr>
-            <p:ph sz="half" idx="1"/>
-          </p:nvPr>
-        </p:nvSpPr>
-        <p:spPr/>
-        <p:txBody>
-          <a:bodyPr>
-            <a:normAutofit fontScale="70000" lnSpcReduction="20000"/>
-          </a:bodyPr>
-          <a:lstStyle/>
-          <a:p>
-            <a:pPr marL="0" indent="0">
-              <a:buNone/>
-            </a:pPr>
-            <a:r>
-              <a:rPr lang="it-IT" dirty="0"/>
-              <a:t>Elementi costitutivi di una pagina Web L'HTML (</a:t>
-            </a:r>
-            <a:r>
-              <a:rPr lang="it-IT" dirty="0" err="1"/>
-              <a:t>Hypertext</a:t>
-            </a:r>
-            <a:r>
-              <a:rPr lang="it-IT" dirty="0"/>
-              <a:t> Markup Language) è la spina dorsale di ogni pagina Web. Definisce la struttura e il contenuto di una pagina web utilizzando vari elementi, come intestazioni, paragrafi, immagini, collegamenti ed elenchi. Ecco alcuni punti chiave da capire:</a:t>
-            </a:r>
-          </a:p>
-          <a:p>
-            <a:pPr marL="0" indent="0">
-              <a:buNone/>
-            </a:pPr>
-            <a:br>
-              <a:rPr lang="it-IT" dirty="0"/>
-            </a:br>
-            <a:endParaRPr lang="it-IT" dirty="0"/>
-          </a:p>
-          <a:p>
-            <a:r>
-              <a:rPr lang="it-IT" dirty="0"/>
-              <a:t>Struttura HTML di base: gli elementi essenziali come , , e .</a:t>
-            </a:r>
-            <a:r>
-              <a:rPr lang="it-IT" b="1" dirty="0"/>
-              <a:t>&lt;html&gt;&lt;head&gt;&lt;body&gt;</a:t>
-            </a:r>
-            <a:endParaRPr lang="it-IT" dirty="0"/>
-          </a:p>
-          <a:p>
-            <a:r>
-              <a:rPr lang="it-IT" dirty="0"/>
-              <a:t>Tag e attributi: come utilizzare tag come , , , e attributi come , , e .</a:t>
-            </a:r>
-            <a:r>
-              <a:rPr lang="it-IT" b="1" dirty="0"/>
-              <a:t>&lt;h1&gt;&lt;p&gt;&lt;</a:t>
-            </a:r>
-            <a:r>
-              <a:rPr lang="it-IT" b="1" dirty="0" err="1"/>
-              <a:t>img</a:t>
-            </a:r>
-            <a:r>
-              <a:rPr lang="it-IT" b="1" dirty="0"/>
-              <a:t>&gt;</a:t>
-            </a:r>
-            <a:r>
-              <a:rPr lang="it-IT" b="1" dirty="0" err="1"/>
-              <a:t>srcalthref</a:t>
-            </a:r>
-            <a:endParaRPr lang="it-IT" dirty="0"/>
-          </a:p>
-          <a:p>
-            <a:r>
-              <a:rPr lang="it-IT" dirty="0"/>
-              <a:t>Elementi semantici: Introduzione ai tag semantici come , , , e al loro significato nella strutturazione dei contenuti.</a:t>
-            </a:r>
-            <a:r>
-              <a:rPr lang="it-IT" b="1" dirty="0"/>
-              <a:t>&lt;</a:t>
-            </a:r>
-            <a:r>
-              <a:rPr lang="it-IT" b="1" dirty="0" err="1"/>
-              <a:t>header</a:t>
-            </a:r>
-            <a:r>
-              <a:rPr lang="it-IT" b="1" dirty="0"/>
-              <a:t>&gt;&lt;</a:t>
-            </a:r>
-            <a:r>
-              <a:rPr lang="it-IT" b="1" dirty="0" err="1"/>
-              <a:t>nav</a:t>
-            </a:r>
-            <a:r>
-              <a:rPr lang="it-IT" b="1" dirty="0"/>
-              <a:t>&gt;&lt;</a:t>
-            </a:r>
-            <a:r>
-              <a:rPr lang="it-IT" b="1" dirty="0" err="1"/>
-              <a:t>section</a:t>
-            </a:r>
-            <a:r>
-              <a:rPr lang="it-IT" b="1" dirty="0"/>
-              <a:t>&gt;</a:t>
-            </a:r>
-            <a:endParaRPr lang="it-IT" dirty="0"/>
-          </a:p>
-          <a:p>
-            <a:r>
-              <a:rPr lang="it-IT" dirty="0"/>
-              <a:t>Creazione di moduli: comprensione degli elementi del modulo come , , , e dei relativi attributi per l'input dell'utente.</a:t>
-            </a:r>
-            <a:r>
-              <a:rPr lang="it-IT" b="1" dirty="0"/>
-              <a:t>&lt;input&gt;&lt;</a:t>
-            </a:r>
-            <a:r>
-              <a:rPr lang="it-IT" b="1" dirty="0" err="1"/>
-              <a:t>select</a:t>
-            </a:r>
-            <a:r>
-              <a:rPr lang="it-IT" b="1" dirty="0"/>
-              <a:t>&gt;&lt;</a:t>
-            </a:r>
-            <a:r>
-              <a:rPr lang="it-IT" b="1" dirty="0" err="1"/>
-              <a:t>textarea</a:t>
-            </a:r>
-            <a:r>
-              <a:rPr lang="it-IT" b="1" dirty="0"/>
-              <a:t>&gt;</a:t>
-            </a:r>
-            <a:endParaRPr lang="it-IT" dirty="0"/>
-          </a:p>
-          <a:p>
-            <a:endParaRPr lang="it-IT" dirty="0"/>
-          </a:p>
-        </p:txBody>
-      </p:sp>
-    </p:spTree>
-    <p:extLst>
-      <p:ext uri="{BB962C8B-B14F-4D97-AF65-F5344CB8AC3E}">
-        <p14:creationId xmlns:p14="http://schemas.microsoft.com/office/powerpoint/2010/main" val="2818506233"/>
-      </p:ext>
-    </p:extLst>
-  </p:cSld>
-  <p:clrMapOvr>
-    <a:masterClrMapping/>
-  </p:clrMapOvr>
-</p:sld>
-</file>
-
-<file path=ppt/slides/slide7.xml><?xml version="1.0" encoding="utf-8"?>
-<p:sld xmlns:a="http://schemas.openxmlformats.org/drawingml/2006/main" xmlns:r="http://schemas.openxmlformats.org/officeDocument/2006/relationships" xmlns:p="http://schemas.openxmlformats.org/presentationml/2006/main">
-  <p:cSld>
-    <p:spTree>
-      <p:nvGrpSpPr>
-        <p:cNvPr id="1" name="">
-          <a:extLst>
-            <a:ext uri="{FF2B5EF4-FFF2-40B4-BE49-F238E27FC236}">
               <a16:creationId xmlns:a16="http://schemas.microsoft.com/office/drawing/2014/main" id="{10AE7349-A69E-4576-94F8-8340E640E29D}"/>
             </a:ext>
           </a:extLst>
@@ -6531,7 +5288,7 @@
 </p:sld>
 </file>
 
-<file path=ppt/slides/slide8.xml><?xml version="1.0" encoding="utf-8"?>
+<file path=ppt/slides/slide11.xml><?xml version="1.0" encoding="utf-8"?>
 <p:sld xmlns:a="http://schemas.openxmlformats.org/drawingml/2006/main" xmlns:r="http://schemas.openxmlformats.org/officeDocument/2006/relationships" xmlns:p="http://schemas.openxmlformats.org/presentationml/2006/main">
   <p:cSld>
     <p:spTree>
@@ -6719,7 +5476,7 @@
 </p:sld>
 </file>
 
-<file path=ppt/slides/slide9.xml><?xml version="1.0" encoding="utf-8"?>
+<file path=ppt/slides/slide12.xml><?xml version="1.0" encoding="utf-8"?>
 <p:sld xmlns:a="http://schemas.openxmlformats.org/drawingml/2006/main" xmlns:r="http://schemas.openxmlformats.org/officeDocument/2006/relationships" xmlns:p="http://schemas.openxmlformats.org/presentationml/2006/main">
   <p:cSld>
     <p:spTree>
@@ -6870,6 +5627,2264 @@
     <p:extLst>
       <p:ext uri="{BB962C8B-B14F-4D97-AF65-F5344CB8AC3E}">
         <p14:creationId xmlns:p14="http://schemas.microsoft.com/office/powerpoint/2010/main" val="3315688190"/>
+      </p:ext>
+    </p:extLst>
+  </p:cSld>
+  <p:clrMapOvr>
+    <a:masterClrMapping/>
+  </p:clrMapOvr>
+</p:sld>
+</file>
+
+<file path=ppt/slides/slide13.xml><?xml version="1.0" encoding="utf-8"?>
+<p:sld xmlns:a="http://schemas.openxmlformats.org/drawingml/2006/main" xmlns:r="http://schemas.openxmlformats.org/officeDocument/2006/relationships" xmlns:p="http://schemas.openxmlformats.org/presentationml/2006/main">
+  <p:cSld>
+    <p:spTree>
+      <p:nvGrpSpPr>
+        <p:cNvPr id="1" name="">
+          <a:extLst>
+            <a:ext uri="{FF2B5EF4-FFF2-40B4-BE49-F238E27FC236}">
+              <a16:creationId xmlns:a16="http://schemas.microsoft.com/office/drawing/2014/main" id="{16416149-AE97-31B2-1968-952CC849A21C}"/>
+            </a:ext>
+          </a:extLst>
+        </p:cNvPr>
+        <p:cNvGrpSpPr/>
+        <p:nvPr/>
+      </p:nvGrpSpPr>
+      <p:grpSpPr>
+        <a:xfrm>
+          <a:off x="0" y="0"/>
+          <a:ext cx="0" cy="0"/>
+          <a:chOff x="0" y="0"/>
+          <a:chExt cx="0" cy="0"/>
+        </a:xfrm>
+      </p:grpSpPr>
+      <p:sp>
+        <p:nvSpPr>
+          <p:cNvPr id="2" name="Titolo 1">
+            <a:extLst>
+              <a:ext uri="{FF2B5EF4-FFF2-40B4-BE49-F238E27FC236}">
+                <a16:creationId xmlns:a16="http://schemas.microsoft.com/office/drawing/2014/main" id="{42173830-B56E-1AE0-ACB4-690E0EF34892}"/>
+              </a:ext>
+            </a:extLst>
+          </p:cNvPr>
+          <p:cNvSpPr>
+            <a:spLocks noGrp="1"/>
+          </p:cNvSpPr>
+          <p:nvPr>
+            <p:ph type="title"/>
+          </p:nvPr>
+        </p:nvSpPr>
+        <p:spPr/>
+        <p:txBody>
+          <a:bodyPr/>
+          <a:lstStyle/>
+          <a:p>
+            <a:r>
+              <a:rPr lang="it-IT" dirty="0"/>
+              <a:t>Tipologia di sviluppo</a:t>
+            </a:r>
+          </a:p>
+        </p:txBody>
+      </p:sp>
+      <p:pic>
+        <p:nvPicPr>
+          <p:cNvPr id="2050" name="Picture 2" descr="Hybrid apps with .NET and Blazor render UI in a Web View control, where the HTML DOM interacts with Blazor and .NET of the native desktop or mobile app.">
+            <a:extLst>
+              <a:ext uri="{FF2B5EF4-FFF2-40B4-BE49-F238E27FC236}">
+                <a16:creationId xmlns:a16="http://schemas.microsoft.com/office/drawing/2014/main" id="{8B3EAF3E-5E51-CB3B-9C4C-A6474F5B343F}"/>
+              </a:ext>
+            </a:extLst>
+          </p:cNvPr>
+          <p:cNvPicPr>
+            <a:picLocks noGrp="1" noChangeAspect="1" noChangeArrowheads="1"/>
+          </p:cNvPicPr>
+          <p:nvPr>
+            <p:ph idx="1"/>
+          </p:nvPr>
+        </p:nvPicPr>
+        <p:blipFill>
+          <a:blip r:embed="rId2">
+            <a:extLst>
+              <a:ext uri="{28A0092B-C50C-407E-A947-70E740481C1C}">
+                <a14:useLocalDpi xmlns:a14="http://schemas.microsoft.com/office/drawing/2010/main" val="0"/>
+              </a:ext>
+            </a:extLst>
+          </a:blip>
+          <a:srcRect/>
+          <a:stretch>
+            <a:fillRect/>
+          </a:stretch>
+        </p:blipFill>
+        <p:spPr bwMode="auto">
+          <a:xfrm>
+            <a:off x="2521464" y="2140077"/>
+            <a:ext cx="7149072" cy="4015767"/>
+          </a:xfrm>
+          <a:prstGeom prst="rect">
+            <a:avLst/>
+          </a:prstGeom>
+          <a:noFill/>
+          <a:extLst>
+            <a:ext uri="{909E8E84-426E-40DD-AFC4-6F175D3DCCD1}">
+              <a14:hiddenFill xmlns:a14="http://schemas.microsoft.com/office/drawing/2010/main">
+                <a:solidFill>
+                  <a:srgbClr val="FFFFFF"/>
+                </a:solidFill>
+              </a14:hiddenFill>
+            </a:ext>
+          </a:extLst>
+        </p:spPr>
+      </p:pic>
+    </p:spTree>
+    <p:extLst>
+      <p:ext uri="{BB962C8B-B14F-4D97-AF65-F5344CB8AC3E}">
+        <p14:creationId xmlns:p14="http://schemas.microsoft.com/office/powerpoint/2010/main" val="1403614634"/>
+      </p:ext>
+    </p:extLst>
+  </p:cSld>
+  <p:clrMapOvr>
+    <a:masterClrMapping/>
+  </p:clrMapOvr>
+</p:sld>
+</file>
+
+<file path=ppt/slides/slide14.xml><?xml version="1.0" encoding="utf-8"?>
+<p:sld xmlns:a="http://schemas.openxmlformats.org/drawingml/2006/main" xmlns:r="http://schemas.openxmlformats.org/officeDocument/2006/relationships" xmlns:p="http://schemas.openxmlformats.org/presentationml/2006/main">
+  <p:cSld>
+    <p:spTree>
+      <p:nvGrpSpPr>
+        <p:cNvPr id="1" name="">
+          <a:extLst>
+            <a:ext uri="{FF2B5EF4-FFF2-40B4-BE49-F238E27FC236}">
+              <a16:creationId xmlns:a16="http://schemas.microsoft.com/office/drawing/2014/main" id="{D2A85660-D938-CAAD-6174-7C2A9CCCDB5E}"/>
+            </a:ext>
+          </a:extLst>
+        </p:cNvPr>
+        <p:cNvGrpSpPr/>
+        <p:nvPr/>
+      </p:nvGrpSpPr>
+      <p:grpSpPr>
+        <a:xfrm>
+          <a:off x="0" y="0"/>
+          <a:ext cx="0" cy="0"/>
+          <a:chOff x="0" y="0"/>
+          <a:chExt cx="0" cy="0"/>
+        </a:xfrm>
+      </p:grpSpPr>
+      <p:sp>
+        <p:nvSpPr>
+          <p:cNvPr id="2" name="Titolo 1">
+            <a:extLst>
+              <a:ext uri="{FF2B5EF4-FFF2-40B4-BE49-F238E27FC236}">
+                <a16:creationId xmlns:a16="http://schemas.microsoft.com/office/drawing/2014/main" id="{4E73A688-FA57-CD80-E3C6-5929223C2E14}"/>
+              </a:ext>
+            </a:extLst>
+          </p:cNvPr>
+          <p:cNvSpPr>
+            <a:spLocks noGrp="1"/>
+          </p:cNvSpPr>
+          <p:nvPr>
+            <p:ph type="title"/>
+          </p:nvPr>
+        </p:nvSpPr>
+        <p:spPr/>
+        <p:txBody>
+          <a:bodyPr/>
+          <a:lstStyle/>
+          <a:p>
+            <a:r>
+              <a:rPr lang="it-IT" dirty="0"/>
+              <a:t>Tipologia di sviluppo</a:t>
+            </a:r>
+          </a:p>
+        </p:txBody>
+      </p:sp>
+      <p:pic>
+        <p:nvPicPr>
+          <p:cNvPr id="5" name="Immagine 4">
+            <a:extLst>
+              <a:ext uri="{FF2B5EF4-FFF2-40B4-BE49-F238E27FC236}">
+                <a16:creationId xmlns:a16="http://schemas.microsoft.com/office/drawing/2014/main" id="{DBCCC1A7-3993-C823-7A71-4F9FFDADB1D7}"/>
+              </a:ext>
+            </a:extLst>
+          </p:cNvPr>
+          <p:cNvPicPr>
+            <a:picLocks noChangeAspect="1"/>
+          </p:cNvPicPr>
+          <p:nvPr/>
+        </p:nvPicPr>
+        <p:blipFill>
+          <a:blip r:embed="rId2"/>
+          <a:stretch>
+            <a:fillRect/>
+          </a:stretch>
+        </p:blipFill>
+        <p:spPr>
+          <a:xfrm>
+            <a:off x="1975861" y="1990539"/>
+            <a:ext cx="8240275" cy="4058216"/>
+          </a:xfrm>
+          <a:prstGeom prst="rect">
+            <a:avLst/>
+          </a:prstGeom>
+        </p:spPr>
+      </p:pic>
+    </p:spTree>
+    <p:extLst>
+      <p:ext uri="{BB962C8B-B14F-4D97-AF65-F5344CB8AC3E}">
+        <p14:creationId xmlns:p14="http://schemas.microsoft.com/office/powerpoint/2010/main" val="407018278"/>
+      </p:ext>
+    </p:extLst>
+  </p:cSld>
+  <p:clrMapOvr>
+    <a:masterClrMapping/>
+  </p:clrMapOvr>
+</p:sld>
+</file>
+
+<file path=ppt/slides/slide15.xml><?xml version="1.0" encoding="utf-8"?>
+<p:sld xmlns:a="http://schemas.openxmlformats.org/drawingml/2006/main" xmlns:r="http://schemas.openxmlformats.org/officeDocument/2006/relationships" xmlns:p="http://schemas.openxmlformats.org/presentationml/2006/main">
+  <p:cSld>
+    <p:spTree>
+      <p:nvGrpSpPr>
+        <p:cNvPr id="1" name="">
+          <a:extLst>
+            <a:ext uri="{FF2B5EF4-FFF2-40B4-BE49-F238E27FC236}">
+              <a16:creationId xmlns:a16="http://schemas.microsoft.com/office/drawing/2014/main" id="{C22E4A5B-D433-43F8-7596-271436EBBF81}"/>
+            </a:ext>
+          </a:extLst>
+        </p:cNvPr>
+        <p:cNvGrpSpPr/>
+        <p:nvPr/>
+      </p:nvGrpSpPr>
+      <p:grpSpPr>
+        <a:xfrm>
+          <a:off x="0" y="0"/>
+          <a:ext cx="0" cy="0"/>
+          <a:chOff x="0" y="0"/>
+          <a:chExt cx="0" cy="0"/>
+        </a:xfrm>
+      </p:grpSpPr>
+      <p:sp>
+        <p:nvSpPr>
+          <p:cNvPr id="2" name="Titolo 1">
+            <a:extLst>
+              <a:ext uri="{FF2B5EF4-FFF2-40B4-BE49-F238E27FC236}">
+                <a16:creationId xmlns:a16="http://schemas.microsoft.com/office/drawing/2014/main" id="{9458D717-DFAA-9429-D83D-6A84946A38F3}"/>
+              </a:ext>
+            </a:extLst>
+          </p:cNvPr>
+          <p:cNvSpPr>
+            <a:spLocks noGrp="1"/>
+          </p:cNvSpPr>
+          <p:nvPr>
+            <p:ph type="title"/>
+          </p:nvPr>
+        </p:nvSpPr>
+        <p:spPr/>
+        <p:txBody>
+          <a:bodyPr/>
+          <a:lstStyle/>
+          <a:p>
+            <a:r>
+              <a:rPr lang="it-IT" dirty="0"/>
+              <a:t>introduzione</a:t>
+            </a:r>
+          </a:p>
+        </p:txBody>
+      </p:sp>
+      <p:sp>
+        <p:nvSpPr>
+          <p:cNvPr id="3" name="Segnaposto contenuto 2">
+            <a:extLst>
+              <a:ext uri="{FF2B5EF4-FFF2-40B4-BE49-F238E27FC236}">
+                <a16:creationId xmlns:a16="http://schemas.microsoft.com/office/drawing/2014/main" id="{D0E0046F-E3B4-0DCA-490F-4D1A361C00AD}"/>
+              </a:ext>
+            </a:extLst>
+          </p:cNvPr>
+          <p:cNvSpPr>
+            <a:spLocks noGrp="1"/>
+          </p:cNvSpPr>
+          <p:nvPr>
+            <p:ph idx="1"/>
+          </p:nvPr>
+        </p:nvSpPr>
+        <p:spPr/>
+        <p:txBody>
+          <a:bodyPr>
+            <a:normAutofit/>
+          </a:bodyPr>
+          <a:lstStyle/>
+          <a:p>
+            <a:pPr marL="0" indent="0" algn="ctr">
+              <a:buNone/>
+            </a:pPr>
+            <a:r>
+              <a:rPr lang="it-IT" sz="6000" dirty="0"/>
+              <a:t>Struttura del progetto</a:t>
+            </a:r>
+          </a:p>
+        </p:txBody>
+      </p:sp>
+    </p:spTree>
+    <p:extLst>
+      <p:ext uri="{BB962C8B-B14F-4D97-AF65-F5344CB8AC3E}">
+        <p14:creationId xmlns:p14="http://schemas.microsoft.com/office/powerpoint/2010/main" val="823252870"/>
+      </p:ext>
+    </p:extLst>
+  </p:cSld>
+  <p:clrMapOvr>
+    <a:masterClrMapping/>
+  </p:clrMapOvr>
+</p:sld>
+</file>
+
+<file path=ppt/slides/slide16.xml><?xml version="1.0" encoding="utf-8"?>
+<p:sld xmlns:a="http://schemas.openxmlformats.org/drawingml/2006/main" xmlns:r="http://schemas.openxmlformats.org/officeDocument/2006/relationships" xmlns:p="http://schemas.openxmlformats.org/presentationml/2006/main">
+  <p:cSld>
+    <p:spTree>
+      <p:nvGrpSpPr>
+        <p:cNvPr id="1" name="">
+          <a:extLst>
+            <a:ext uri="{FF2B5EF4-FFF2-40B4-BE49-F238E27FC236}">
+              <a16:creationId xmlns:a16="http://schemas.microsoft.com/office/drawing/2014/main" id="{354A9DD8-F1DC-3496-DC42-F2A547402E19}"/>
+            </a:ext>
+          </a:extLst>
+        </p:cNvPr>
+        <p:cNvGrpSpPr/>
+        <p:nvPr/>
+      </p:nvGrpSpPr>
+      <p:grpSpPr>
+        <a:xfrm>
+          <a:off x="0" y="0"/>
+          <a:ext cx="0" cy="0"/>
+          <a:chOff x="0" y="0"/>
+          <a:chExt cx="0" cy="0"/>
+        </a:xfrm>
+      </p:grpSpPr>
+      <p:sp>
+        <p:nvSpPr>
+          <p:cNvPr id="2" name="Titolo 1">
+            <a:extLst>
+              <a:ext uri="{FF2B5EF4-FFF2-40B4-BE49-F238E27FC236}">
+                <a16:creationId xmlns:a16="http://schemas.microsoft.com/office/drawing/2014/main" id="{DB4C04BE-BB21-E1A0-9480-E5C631F46FFE}"/>
+              </a:ext>
+            </a:extLst>
+          </p:cNvPr>
+          <p:cNvSpPr>
+            <a:spLocks noGrp="1"/>
+          </p:cNvSpPr>
+          <p:nvPr>
+            <p:ph type="title"/>
+          </p:nvPr>
+        </p:nvSpPr>
+        <p:spPr/>
+        <p:txBody>
+          <a:bodyPr/>
+          <a:lstStyle/>
+          <a:p>
+            <a:r>
+              <a:rPr lang="it-IT" dirty="0"/>
+              <a:t>Componenti</a:t>
+            </a:r>
+          </a:p>
+        </p:txBody>
+      </p:sp>
+      <p:sp>
+        <p:nvSpPr>
+          <p:cNvPr id="3" name="Segnaposto contenuto 2">
+            <a:extLst>
+              <a:ext uri="{FF2B5EF4-FFF2-40B4-BE49-F238E27FC236}">
+                <a16:creationId xmlns:a16="http://schemas.microsoft.com/office/drawing/2014/main" id="{FEB54766-180C-BC63-6AD3-BED3C0AAAC9D}"/>
+              </a:ext>
+            </a:extLst>
+          </p:cNvPr>
+          <p:cNvSpPr>
+            <a:spLocks noGrp="1"/>
+          </p:cNvSpPr>
+          <p:nvPr>
+            <p:ph idx="1"/>
+          </p:nvPr>
+        </p:nvSpPr>
+        <p:spPr/>
+        <p:txBody>
+          <a:bodyPr>
+            <a:normAutofit/>
+          </a:bodyPr>
+          <a:lstStyle/>
+          <a:p>
+            <a:pPr marL="0" indent="0" algn="ctr">
+              <a:buNone/>
+            </a:pPr>
+            <a:r>
+              <a:rPr lang="it-IT" sz="1800" dirty="0">
+                <a:solidFill>
+                  <a:srgbClr val="3D3D3D"/>
+                </a:solidFill>
+                <a:effectLst/>
+                <a:latin typeface="Gill Sans MT" panose="020B0502020104020203" pitchFamily="34" charset="0"/>
+              </a:rPr>
+              <a:t>Un componente è un elemento dell'interfaccia utente, come una pagina, una finestra di dialogo o un modulo di inserimento dati. I componenti sono classi .NET C# incorporati in assembly .NET.</a:t>
+            </a:r>
+            <a:endParaRPr lang="it-IT" dirty="0"/>
+          </a:p>
+        </p:txBody>
+      </p:sp>
+    </p:spTree>
+    <p:extLst>
+      <p:ext uri="{BB962C8B-B14F-4D97-AF65-F5344CB8AC3E}">
+        <p14:creationId xmlns:p14="http://schemas.microsoft.com/office/powerpoint/2010/main" val="3294199067"/>
+      </p:ext>
+    </p:extLst>
+  </p:cSld>
+  <p:clrMapOvr>
+    <a:masterClrMapping/>
+  </p:clrMapOvr>
+</p:sld>
+</file>
+
+<file path=ppt/slides/slide17.xml><?xml version="1.0" encoding="utf-8"?>
+<p:sld xmlns:a="http://schemas.openxmlformats.org/drawingml/2006/main" xmlns:r="http://schemas.openxmlformats.org/officeDocument/2006/relationships" xmlns:p="http://schemas.openxmlformats.org/presentationml/2006/main">
+  <p:cSld>
+    <p:spTree>
+      <p:nvGrpSpPr>
+        <p:cNvPr id="1" name="">
+          <a:extLst>
+            <a:ext uri="{FF2B5EF4-FFF2-40B4-BE49-F238E27FC236}">
+              <a16:creationId xmlns:a16="http://schemas.microsoft.com/office/drawing/2014/main" id="{05BC3AA0-3BF0-7D29-A7DE-FDE9602373BB}"/>
+            </a:ext>
+          </a:extLst>
+        </p:cNvPr>
+        <p:cNvGrpSpPr/>
+        <p:nvPr/>
+      </p:nvGrpSpPr>
+      <p:grpSpPr>
+        <a:xfrm>
+          <a:off x="0" y="0"/>
+          <a:ext cx="0" cy="0"/>
+          <a:chOff x="0" y="0"/>
+          <a:chExt cx="0" cy="0"/>
+        </a:xfrm>
+      </p:grpSpPr>
+      <p:sp>
+        <p:nvSpPr>
+          <p:cNvPr id="2" name="Titolo 1">
+            <a:extLst>
+              <a:ext uri="{FF2B5EF4-FFF2-40B4-BE49-F238E27FC236}">
+                <a16:creationId xmlns:a16="http://schemas.microsoft.com/office/drawing/2014/main" id="{941D7D17-8F42-2869-D677-CC257E1B352F}"/>
+              </a:ext>
+            </a:extLst>
+          </p:cNvPr>
+          <p:cNvSpPr>
+            <a:spLocks noGrp="1"/>
+          </p:cNvSpPr>
+          <p:nvPr>
+            <p:ph type="title"/>
+          </p:nvPr>
+        </p:nvSpPr>
+        <p:spPr/>
+        <p:txBody>
+          <a:bodyPr/>
+          <a:lstStyle/>
+          <a:p>
+            <a:r>
+              <a:rPr lang="it-IT" dirty="0"/>
+              <a:t>Componenti</a:t>
+            </a:r>
+          </a:p>
+        </p:txBody>
+      </p:sp>
+      <p:sp>
+        <p:nvSpPr>
+          <p:cNvPr id="3" name="Segnaposto contenuto 2">
+            <a:extLst>
+              <a:ext uri="{FF2B5EF4-FFF2-40B4-BE49-F238E27FC236}">
+                <a16:creationId xmlns:a16="http://schemas.microsoft.com/office/drawing/2014/main" id="{F2CF8558-1E7C-3724-B126-0D631F356236}"/>
+              </a:ext>
+            </a:extLst>
+          </p:cNvPr>
+          <p:cNvSpPr>
+            <a:spLocks noGrp="1"/>
+          </p:cNvSpPr>
+          <p:nvPr>
+            <p:ph idx="1"/>
+          </p:nvPr>
+        </p:nvSpPr>
+        <p:spPr/>
+        <p:txBody>
+          <a:bodyPr/>
+          <a:lstStyle/>
+          <a:p>
+            <a:endParaRPr lang="it-IT" dirty="0"/>
+          </a:p>
+        </p:txBody>
+      </p:sp>
+      <p:pic>
+        <p:nvPicPr>
+          <p:cNvPr id="1026" name="Picture 2">
+            <a:extLst>
+              <a:ext uri="{FF2B5EF4-FFF2-40B4-BE49-F238E27FC236}">
+                <a16:creationId xmlns:a16="http://schemas.microsoft.com/office/drawing/2014/main" id="{6E2BD605-33A4-5AEA-092B-59B553C2C837}"/>
+              </a:ext>
+            </a:extLst>
+          </p:cNvPr>
+          <p:cNvPicPr>
+            <a:picLocks noChangeAspect="1" noChangeArrowheads="1"/>
+          </p:cNvPicPr>
+          <p:nvPr/>
+        </p:nvPicPr>
+        <p:blipFill>
+          <a:blip r:embed="rId2">
+            <a:extLst>
+              <a:ext uri="{28A0092B-C50C-407E-A947-70E740481C1C}">
+                <a14:useLocalDpi xmlns:a14="http://schemas.microsoft.com/office/drawing/2010/main" val="0"/>
+              </a:ext>
+            </a:extLst>
+          </a:blip>
+          <a:srcRect/>
+          <a:stretch>
+            <a:fillRect/>
+          </a:stretch>
+        </p:blipFill>
+        <p:spPr bwMode="auto">
+          <a:xfrm>
+            <a:off x="4689083" y="586854"/>
+            <a:ext cx="2813832" cy="6182987"/>
+          </a:xfrm>
+          <a:prstGeom prst="rect">
+            <a:avLst/>
+          </a:prstGeom>
+          <a:noFill/>
+          <a:extLst>
+            <a:ext uri="{909E8E84-426E-40DD-AFC4-6F175D3DCCD1}">
+              <a14:hiddenFill xmlns:a14="http://schemas.microsoft.com/office/drawing/2010/main">
+                <a:solidFill>
+                  <a:srgbClr val="FFFFFF"/>
+                </a:solidFill>
+              </a14:hiddenFill>
+            </a:ext>
+          </a:extLst>
+        </p:spPr>
+      </p:pic>
+    </p:spTree>
+    <p:extLst>
+      <p:ext uri="{BB962C8B-B14F-4D97-AF65-F5344CB8AC3E}">
+        <p14:creationId xmlns:p14="http://schemas.microsoft.com/office/powerpoint/2010/main" val="4054004873"/>
+      </p:ext>
+    </p:extLst>
+  </p:cSld>
+  <p:clrMapOvr>
+    <a:masterClrMapping/>
+  </p:clrMapOvr>
+</p:sld>
+</file>
+
+<file path=ppt/slides/slide18.xml><?xml version="1.0" encoding="utf-8"?>
+<p:sld xmlns:a="http://schemas.openxmlformats.org/drawingml/2006/main" xmlns:r="http://schemas.openxmlformats.org/officeDocument/2006/relationships" xmlns:p="http://schemas.openxmlformats.org/presentationml/2006/main">
+  <p:cSld>
+    <p:spTree>
+      <p:nvGrpSpPr>
+        <p:cNvPr id="1" name="">
+          <a:extLst>
+            <a:ext uri="{FF2B5EF4-FFF2-40B4-BE49-F238E27FC236}">
+              <a16:creationId xmlns:a16="http://schemas.microsoft.com/office/drawing/2014/main" id="{E1C9BDE8-8398-632F-A4DE-429DF65B7AEF}"/>
+            </a:ext>
+          </a:extLst>
+        </p:cNvPr>
+        <p:cNvGrpSpPr/>
+        <p:nvPr/>
+      </p:nvGrpSpPr>
+      <p:grpSpPr>
+        <a:xfrm>
+          <a:off x="0" y="0"/>
+          <a:ext cx="0" cy="0"/>
+          <a:chOff x="0" y="0"/>
+          <a:chExt cx="0" cy="0"/>
+        </a:xfrm>
+      </p:grpSpPr>
+      <p:sp>
+        <p:nvSpPr>
+          <p:cNvPr id="2" name="Titolo 1">
+            <a:extLst>
+              <a:ext uri="{FF2B5EF4-FFF2-40B4-BE49-F238E27FC236}">
+                <a16:creationId xmlns:a16="http://schemas.microsoft.com/office/drawing/2014/main" id="{35100D62-8D6C-5A42-45A7-12E72574EEF5}"/>
+              </a:ext>
+            </a:extLst>
+          </p:cNvPr>
+          <p:cNvSpPr>
+            <a:spLocks noGrp="1"/>
+          </p:cNvSpPr>
+          <p:nvPr>
+            <p:ph type="title"/>
+          </p:nvPr>
+        </p:nvSpPr>
+        <p:spPr/>
+        <p:txBody>
+          <a:bodyPr/>
+          <a:lstStyle/>
+          <a:p>
+            <a:r>
+              <a:rPr lang="it-IT" dirty="0"/>
+              <a:t>Componenti</a:t>
+            </a:r>
+          </a:p>
+        </p:txBody>
+      </p:sp>
+      <p:pic>
+        <p:nvPicPr>
+          <p:cNvPr id="3078" name="Picture 6">
+            <a:extLst>
+              <a:ext uri="{FF2B5EF4-FFF2-40B4-BE49-F238E27FC236}">
+                <a16:creationId xmlns:a16="http://schemas.microsoft.com/office/drawing/2014/main" id="{6E617365-08F6-625B-2AEF-607773BA8327}"/>
+              </a:ext>
+            </a:extLst>
+          </p:cNvPr>
+          <p:cNvPicPr>
+            <a:picLocks noGrp="1" noChangeAspect="1" noChangeArrowheads="1"/>
+          </p:cNvPicPr>
+          <p:nvPr>
+            <p:ph idx="1"/>
+          </p:nvPr>
+        </p:nvPicPr>
+        <p:blipFill>
+          <a:blip r:embed="rId2">
+            <a:extLst>
+              <a:ext uri="{28A0092B-C50C-407E-A947-70E740481C1C}">
+                <a14:useLocalDpi xmlns:a14="http://schemas.microsoft.com/office/drawing/2010/main" val="0"/>
+              </a:ext>
+            </a:extLst>
+          </a:blip>
+          <a:stretch>
+            <a:fillRect/>
+          </a:stretch>
+        </p:blipFill>
+        <p:spPr bwMode="auto">
+          <a:xfrm>
+            <a:off x="3735977" y="828595"/>
+            <a:ext cx="4313341" cy="5833462"/>
+          </a:xfrm>
+          <a:prstGeom prst="rect">
+            <a:avLst/>
+          </a:prstGeom>
+          <a:noFill/>
+          <a:extLst>
+            <a:ext uri="{909E8E84-426E-40DD-AFC4-6F175D3DCCD1}">
+              <a14:hiddenFill xmlns:a14="http://schemas.microsoft.com/office/drawing/2010/main">
+                <a:solidFill>
+                  <a:srgbClr val="FFFFFF"/>
+                </a:solidFill>
+              </a14:hiddenFill>
+            </a:ext>
+          </a:extLst>
+        </p:spPr>
+      </p:pic>
+    </p:spTree>
+    <p:extLst>
+      <p:ext uri="{BB962C8B-B14F-4D97-AF65-F5344CB8AC3E}">
+        <p14:creationId xmlns:p14="http://schemas.microsoft.com/office/powerpoint/2010/main" val="4101994403"/>
+      </p:ext>
+    </p:extLst>
+  </p:cSld>
+  <p:clrMapOvr>
+    <a:masterClrMapping/>
+  </p:clrMapOvr>
+</p:sld>
+</file>
+
+<file path=ppt/slides/slide2.xml><?xml version="1.0" encoding="utf-8"?>
+<p:sld xmlns:a="http://schemas.openxmlformats.org/drawingml/2006/main" xmlns:r="http://schemas.openxmlformats.org/officeDocument/2006/relationships" xmlns:p="http://schemas.openxmlformats.org/presentationml/2006/main">
+  <p:cSld>
+    <p:spTree>
+      <p:nvGrpSpPr>
+        <p:cNvPr id="1" name="">
+          <a:extLst>
+            <a:ext uri="{FF2B5EF4-FFF2-40B4-BE49-F238E27FC236}">
+              <a16:creationId xmlns:a16="http://schemas.microsoft.com/office/drawing/2014/main" id="{5EA29620-C025-A81E-664B-85706BA61717}"/>
+            </a:ext>
+          </a:extLst>
+        </p:cNvPr>
+        <p:cNvGrpSpPr/>
+        <p:nvPr/>
+      </p:nvGrpSpPr>
+      <p:grpSpPr>
+        <a:xfrm>
+          <a:off x="0" y="0"/>
+          <a:ext cx="0" cy="0"/>
+          <a:chOff x="0" y="0"/>
+          <a:chExt cx="0" cy="0"/>
+        </a:xfrm>
+      </p:grpSpPr>
+      <p:pic>
+        <p:nvPicPr>
+          <p:cNvPr id="7" name="Picture 4" descr="Alessio Iafrate">
+            <a:extLst>
+              <a:ext uri="{FF2B5EF4-FFF2-40B4-BE49-F238E27FC236}">
+                <a16:creationId xmlns:a16="http://schemas.microsoft.com/office/drawing/2014/main" id="{9B98A5D0-49D4-9620-A4F0-96279B306A83}"/>
+              </a:ext>
+            </a:extLst>
+          </p:cNvPr>
+          <p:cNvPicPr>
+            <a:picLocks noChangeAspect="1" noChangeArrowheads="1"/>
+          </p:cNvPicPr>
+          <p:nvPr/>
+        </p:nvPicPr>
+        <p:blipFill>
+          <a:blip r:embed="rId2">
+            <a:extLst>
+              <a:ext uri="{28A0092B-C50C-407E-A947-70E740481C1C}">
+                <a14:useLocalDpi xmlns:a14="http://schemas.microsoft.com/office/drawing/2010/main" val="0"/>
+              </a:ext>
+            </a:extLst>
+          </a:blip>
+          <a:srcRect/>
+          <a:stretch>
+            <a:fillRect/>
+          </a:stretch>
+        </p:blipFill>
+        <p:spPr bwMode="auto">
+          <a:xfrm>
+            <a:off x="6433385" y="2563976"/>
+            <a:ext cx="2670174" cy="2670174"/>
+          </a:xfrm>
+          <a:prstGeom prst="rect">
+            <a:avLst/>
+          </a:prstGeom>
+          <a:noFill/>
+          <a:extLst>
+            <a:ext uri="{909E8E84-426E-40DD-AFC4-6F175D3DCCD1}">
+              <a14:hiddenFill xmlns:a14="http://schemas.microsoft.com/office/drawing/2010/main">
+                <a:solidFill>
+                  <a:srgbClr val="FFFFFF"/>
+                </a:solidFill>
+              </a14:hiddenFill>
+            </a:ext>
+          </a:extLst>
+        </p:spPr>
+      </p:pic>
+      <p:sp>
+        <p:nvSpPr>
+          <p:cNvPr id="2" name="Titolo 1">
+            <a:extLst>
+              <a:ext uri="{FF2B5EF4-FFF2-40B4-BE49-F238E27FC236}">
+                <a16:creationId xmlns:a16="http://schemas.microsoft.com/office/drawing/2014/main" id="{D1A4647A-3BD4-3E76-DA97-ECE04BAD72EE}"/>
+              </a:ext>
+            </a:extLst>
+          </p:cNvPr>
+          <p:cNvSpPr>
+            <a:spLocks noGrp="1"/>
+          </p:cNvSpPr>
+          <p:nvPr>
+            <p:ph type="title"/>
+          </p:nvPr>
+        </p:nvSpPr>
+        <p:spPr/>
+        <p:txBody>
+          <a:bodyPr/>
+          <a:lstStyle/>
+          <a:p>
+            <a:r>
+              <a:rPr lang="it-IT" dirty="0"/>
+              <a:t>Conosciamoci un </a:t>
+            </a:r>
+            <a:r>
+              <a:rPr lang="it-IT" dirty="0" err="1"/>
+              <a:t>pò</a:t>
+            </a:r>
+            <a:endParaRPr lang="it-IT" dirty="0"/>
+          </a:p>
+        </p:txBody>
+      </p:sp>
+      <p:sp>
+        <p:nvSpPr>
+          <p:cNvPr id="4" name="Sottotitolo 2">
+            <a:extLst>
+              <a:ext uri="{FF2B5EF4-FFF2-40B4-BE49-F238E27FC236}">
+                <a16:creationId xmlns:a16="http://schemas.microsoft.com/office/drawing/2014/main" id="{7DD836F4-D8C4-620B-0AC3-1DA089D5EB89}"/>
+              </a:ext>
+            </a:extLst>
+          </p:cNvPr>
+          <p:cNvSpPr>
+            <a:spLocks noGrp="1"/>
+          </p:cNvSpPr>
+          <p:nvPr>
+            <p:ph idx="1"/>
+          </p:nvPr>
+        </p:nvSpPr>
+        <p:spPr>
+          <a:xfrm>
+            <a:off x="581025" y="2181225"/>
+            <a:ext cx="11029950" cy="3678238"/>
+          </a:xfrm>
+        </p:spPr>
+        <p:txBody>
+          <a:bodyPr>
+            <a:normAutofit/>
+          </a:bodyPr>
+          <a:lstStyle/>
+          <a:p>
+            <a:r>
+              <a:rPr lang="it-IT" dirty="0"/>
+              <a:t>Alessio Iafrate</a:t>
+            </a:r>
+          </a:p>
+          <a:p>
+            <a:r>
+              <a:rPr lang="it-IT" dirty="0"/>
+              <a:t>Freelance Developer – Microsoft MVP</a:t>
+            </a:r>
+          </a:p>
+          <a:p>
+            <a:r>
+              <a:rPr lang="it-IT" dirty="0"/>
+              <a:t>Esperto tecnologie Microsoft</a:t>
+            </a:r>
+          </a:p>
+          <a:p>
+            <a:pPr lvl="1"/>
+            <a:r>
+              <a:rPr lang="it-IT" dirty="0"/>
+              <a:t>C# </a:t>
+            </a:r>
+            <a:r>
+              <a:rPr lang="it-IT" dirty="0" err="1"/>
+              <a:t>.Net</a:t>
+            </a:r>
+            <a:endParaRPr lang="it-IT" dirty="0"/>
+          </a:p>
+          <a:p>
+            <a:pPr lvl="1"/>
+            <a:r>
+              <a:rPr lang="it-IT" dirty="0"/>
+              <a:t>Azure</a:t>
+            </a:r>
+          </a:p>
+        </p:txBody>
+      </p:sp>
+      <p:pic>
+        <p:nvPicPr>
+          <p:cNvPr id="5" name="Picture 2" descr="2025 Microsoft Most Valuable Professional (MVP)">
+            <a:extLst>
+              <a:ext uri="{FF2B5EF4-FFF2-40B4-BE49-F238E27FC236}">
+                <a16:creationId xmlns:a16="http://schemas.microsoft.com/office/drawing/2014/main" id="{89CE264C-ED5A-9808-7BAC-5A9EB745F722}"/>
+              </a:ext>
+            </a:extLst>
+          </p:cNvPr>
+          <p:cNvPicPr>
+            <a:picLocks noChangeAspect="1" noChangeArrowheads="1"/>
+          </p:cNvPicPr>
+          <p:nvPr/>
+        </p:nvPicPr>
+        <p:blipFill>
+          <a:blip r:embed="rId3">
+            <a:extLst>
+              <a:ext uri="{28A0092B-C50C-407E-A947-70E740481C1C}">
+                <a14:useLocalDpi xmlns:a14="http://schemas.microsoft.com/office/drawing/2010/main" val="0"/>
+              </a:ext>
+            </a:extLst>
+          </a:blip>
+          <a:srcRect/>
+          <a:stretch>
+            <a:fillRect/>
+          </a:stretch>
+        </p:blipFill>
+        <p:spPr bwMode="auto">
+          <a:xfrm>
+            <a:off x="8444752" y="2411198"/>
+            <a:ext cx="1586351" cy="1586351"/>
+          </a:xfrm>
+          <a:prstGeom prst="rect">
+            <a:avLst/>
+          </a:prstGeom>
+          <a:noFill/>
+          <a:extLst>
+            <a:ext uri="{909E8E84-426E-40DD-AFC4-6F175D3DCCD1}">
+              <a14:hiddenFill xmlns:a14="http://schemas.microsoft.com/office/drawing/2010/main">
+                <a:solidFill>
+                  <a:srgbClr val="FFFFFF"/>
+                </a:solidFill>
+              </a14:hiddenFill>
+            </a:ext>
+          </a:extLst>
+        </p:spPr>
+      </p:pic>
+      <p:pic>
+        <p:nvPicPr>
+          <p:cNvPr id="6" name="Elemento grafico 5">
+            <a:extLst>
+              <a:ext uri="{FF2B5EF4-FFF2-40B4-BE49-F238E27FC236}">
+                <a16:creationId xmlns:a16="http://schemas.microsoft.com/office/drawing/2014/main" id="{B0819E5E-A0A4-728D-AF4B-6E5BE979C3DC}"/>
+              </a:ext>
+            </a:extLst>
+          </p:cNvPr>
+          <p:cNvPicPr>
+            <a:picLocks noChangeAspect="1"/>
+          </p:cNvPicPr>
+          <p:nvPr/>
+        </p:nvPicPr>
+        <p:blipFill>
+          <a:blip r:embed="rId4">
+            <a:extLst>
+              <a:ext uri="{96DAC541-7B7A-43D3-8B79-37D633B846F1}">
+                <asvg:svgBlip xmlns:asvg="http://schemas.microsoft.com/office/drawing/2016/SVG/main" r:embed="rId5"/>
+              </a:ext>
+            </a:extLst>
+          </a:blip>
+          <a:stretch>
+            <a:fillRect/>
+          </a:stretch>
+        </p:blipFill>
+        <p:spPr>
+          <a:xfrm>
+            <a:off x="10144203" y="2413747"/>
+            <a:ext cx="1055867" cy="1583802"/>
+          </a:xfrm>
+          <a:prstGeom prst="rect">
+            <a:avLst/>
+          </a:prstGeom>
+        </p:spPr>
+      </p:pic>
+    </p:spTree>
+    <p:extLst>
+      <p:ext uri="{BB962C8B-B14F-4D97-AF65-F5344CB8AC3E}">
+        <p14:creationId xmlns:p14="http://schemas.microsoft.com/office/powerpoint/2010/main" val="1620235292"/>
+      </p:ext>
+    </p:extLst>
+  </p:cSld>
+  <p:clrMapOvr>
+    <a:masterClrMapping/>
+  </p:clrMapOvr>
+  <p:timing>
+    <p:tnLst>
+      <p:par>
+        <p:cTn id="1" dur="indefinite" restart="never" nodeType="tmRoot">
+          <p:childTnLst>
+            <p:seq concurrent="1" nextAc="seek">
+              <p:cTn id="2" dur="indefinite" nodeType="mainSeq">
+                <p:childTnLst>
+                  <p:par>
+                    <p:cTn id="3" fill="hold">
+                      <p:stCondLst>
+                        <p:cond delay="indefinite"/>
+                        <p:cond evt="onBegin" delay="0">
+                          <p:tn val="2"/>
+                        </p:cond>
+                      </p:stCondLst>
+                      <p:childTnLst>
+                        <p:par>
+                          <p:cTn id="4" fill="hold">
+                            <p:stCondLst>
+                              <p:cond delay="0"/>
+                            </p:stCondLst>
+                            <p:childTnLst>
+                              <p:par>
+                                <p:cTn id="5" presetID="10" presetClass="entr" presetSubtype="0" fill="hold" grpId="0" nodeType="withEffect">
+                                  <p:stCondLst>
+                                    <p:cond delay="2000"/>
+                                  </p:stCondLst>
+                                  <p:iterate type="lt">
+                                    <p:tmPct val="10000"/>
+                                  </p:iterate>
+                                  <p:childTnLst>
+                                    <p:set>
+                                      <p:cBhvr>
+                                        <p:cTn id="6" dur="1" fill="hold">
+                                          <p:stCondLst>
+                                            <p:cond delay="0"/>
+                                          </p:stCondLst>
+                                        </p:cTn>
+                                        <p:tgtEl>
+                                          <p:spTgt spid="4">
+                                            <p:txEl>
+                                              <p:pRg st="0" end="0"/>
+                                            </p:txEl>
+                                          </p:spTgt>
+                                        </p:tgtEl>
+                                        <p:attrNameLst>
+                                          <p:attrName>style.visibility</p:attrName>
+                                        </p:attrNameLst>
+                                      </p:cBhvr>
+                                      <p:to>
+                                        <p:strVal val="visible"/>
+                                      </p:to>
+                                    </p:set>
+                                    <p:animEffect transition="in" filter="fade">
+                                      <p:cBhvr>
+                                        <p:cTn id="7" dur="400"/>
+                                        <p:tgtEl>
+                                          <p:spTgt spid="4">
+                                            <p:txEl>
+                                              <p:pRg st="0" end="0"/>
+                                            </p:txEl>
+                                          </p:spTgt>
+                                        </p:tgtEl>
+                                      </p:cBhvr>
+                                    </p:animEffect>
+                                  </p:childTnLst>
+                                </p:cTn>
+                              </p:par>
+                            </p:childTnLst>
+                          </p:cTn>
+                        </p:par>
+                      </p:childTnLst>
+                    </p:cTn>
+                  </p:par>
+                  <p:par>
+                    <p:cTn id="8" fill="hold">
+                      <p:stCondLst>
+                        <p:cond delay="indefinite"/>
+                      </p:stCondLst>
+                      <p:childTnLst>
+                        <p:par>
+                          <p:cTn id="9" fill="hold">
+                            <p:stCondLst>
+                              <p:cond delay="0"/>
+                            </p:stCondLst>
+                            <p:childTnLst>
+                              <p:par>
+                                <p:cTn id="10" presetID="10" presetClass="entr" presetSubtype="0" fill="hold" grpId="0" nodeType="clickEffect">
+                                  <p:stCondLst>
+                                    <p:cond delay="2000"/>
+                                  </p:stCondLst>
+                                  <p:iterate type="lt">
+                                    <p:tmPct val="10000"/>
+                                  </p:iterate>
+                                  <p:childTnLst>
+                                    <p:set>
+                                      <p:cBhvr>
+                                        <p:cTn id="11" dur="1" fill="hold">
+                                          <p:stCondLst>
+                                            <p:cond delay="0"/>
+                                          </p:stCondLst>
+                                        </p:cTn>
+                                        <p:tgtEl>
+                                          <p:spTgt spid="4">
+                                            <p:txEl>
+                                              <p:pRg st="1" end="1"/>
+                                            </p:txEl>
+                                          </p:spTgt>
+                                        </p:tgtEl>
+                                        <p:attrNameLst>
+                                          <p:attrName>style.visibility</p:attrName>
+                                        </p:attrNameLst>
+                                      </p:cBhvr>
+                                      <p:to>
+                                        <p:strVal val="visible"/>
+                                      </p:to>
+                                    </p:set>
+                                    <p:animEffect transition="in" filter="fade">
+                                      <p:cBhvr>
+                                        <p:cTn id="12" dur="400"/>
+                                        <p:tgtEl>
+                                          <p:spTgt spid="4">
+                                            <p:txEl>
+                                              <p:pRg st="1" end="1"/>
+                                            </p:txEl>
+                                          </p:spTgt>
+                                        </p:tgtEl>
+                                      </p:cBhvr>
+                                    </p:animEffect>
+                                  </p:childTnLst>
+                                </p:cTn>
+                              </p:par>
+                            </p:childTnLst>
+                          </p:cTn>
+                        </p:par>
+                      </p:childTnLst>
+                    </p:cTn>
+                  </p:par>
+                  <p:par>
+                    <p:cTn id="13" fill="hold">
+                      <p:stCondLst>
+                        <p:cond delay="indefinite"/>
+                      </p:stCondLst>
+                      <p:childTnLst>
+                        <p:par>
+                          <p:cTn id="14" fill="hold">
+                            <p:stCondLst>
+                              <p:cond delay="0"/>
+                            </p:stCondLst>
+                            <p:childTnLst>
+                              <p:par>
+                                <p:cTn id="15" presetID="10" presetClass="entr" presetSubtype="0" fill="hold" grpId="0" nodeType="clickEffect">
+                                  <p:stCondLst>
+                                    <p:cond delay="2000"/>
+                                  </p:stCondLst>
+                                  <p:iterate type="lt">
+                                    <p:tmPct val="10000"/>
+                                  </p:iterate>
+                                  <p:childTnLst>
+                                    <p:set>
+                                      <p:cBhvr>
+                                        <p:cTn id="16" dur="1" fill="hold">
+                                          <p:stCondLst>
+                                            <p:cond delay="0"/>
+                                          </p:stCondLst>
+                                        </p:cTn>
+                                        <p:tgtEl>
+                                          <p:spTgt spid="4">
+                                            <p:txEl>
+                                              <p:pRg st="2" end="2"/>
+                                            </p:txEl>
+                                          </p:spTgt>
+                                        </p:tgtEl>
+                                        <p:attrNameLst>
+                                          <p:attrName>style.visibility</p:attrName>
+                                        </p:attrNameLst>
+                                      </p:cBhvr>
+                                      <p:to>
+                                        <p:strVal val="visible"/>
+                                      </p:to>
+                                    </p:set>
+                                    <p:animEffect transition="in" filter="fade">
+                                      <p:cBhvr>
+                                        <p:cTn id="17" dur="400"/>
+                                        <p:tgtEl>
+                                          <p:spTgt spid="4">
+                                            <p:txEl>
+                                              <p:pRg st="2" end="2"/>
+                                            </p:txEl>
+                                          </p:spTgt>
+                                        </p:tgtEl>
+                                      </p:cBhvr>
+                                    </p:animEffect>
+                                  </p:childTnLst>
+                                </p:cTn>
+                              </p:par>
+                              <p:par>
+                                <p:cTn id="18" presetID="10" presetClass="entr" presetSubtype="0" fill="hold" grpId="0" nodeType="withEffect">
+                                  <p:stCondLst>
+                                    <p:cond delay="2000"/>
+                                  </p:stCondLst>
+                                  <p:iterate type="lt">
+                                    <p:tmPct val="10000"/>
+                                  </p:iterate>
+                                  <p:childTnLst>
+                                    <p:set>
+                                      <p:cBhvr>
+                                        <p:cTn id="19" dur="1" fill="hold">
+                                          <p:stCondLst>
+                                            <p:cond delay="0"/>
+                                          </p:stCondLst>
+                                        </p:cTn>
+                                        <p:tgtEl>
+                                          <p:spTgt spid="4">
+                                            <p:txEl>
+                                              <p:pRg st="3" end="3"/>
+                                            </p:txEl>
+                                          </p:spTgt>
+                                        </p:tgtEl>
+                                        <p:attrNameLst>
+                                          <p:attrName>style.visibility</p:attrName>
+                                        </p:attrNameLst>
+                                      </p:cBhvr>
+                                      <p:to>
+                                        <p:strVal val="visible"/>
+                                      </p:to>
+                                    </p:set>
+                                    <p:animEffect transition="in" filter="fade">
+                                      <p:cBhvr>
+                                        <p:cTn id="20" dur="400"/>
+                                        <p:tgtEl>
+                                          <p:spTgt spid="4">
+                                            <p:txEl>
+                                              <p:pRg st="3" end="3"/>
+                                            </p:txEl>
+                                          </p:spTgt>
+                                        </p:tgtEl>
+                                      </p:cBhvr>
+                                    </p:animEffect>
+                                  </p:childTnLst>
+                                </p:cTn>
+                              </p:par>
+                              <p:par>
+                                <p:cTn id="21" presetID="10" presetClass="entr" presetSubtype="0" fill="hold" grpId="0" nodeType="withEffect">
+                                  <p:stCondLst>
+                                    <p:cond delay="2000"/>
+                                  </p:stCondLst>
+                                  <p:iterate type="lt">
+                                    <p:tmPct val="10000"/>
+                                  </p:iterate>
+                                  <p:childTnLst>
+                                    <p:set>
+                                      <p:cBhvr>
+                                        <p:cTn id="22" dur="1" fill="hold">
+                                          <p:stCondLst>
+                                            <p:cond delay="0"/>
+                                          </p:stCondLst>
+                                        </p:cTn>
+                                        <p:tgtEl>
+                                          <p:spTgt spid="4">
+                                            <p:txEl>
+                                              <p:pRg st="4" end="4"/>
+                                            </p:txEl>
+                                          </p:spTgt>
+                                        </p:tgtEl>
+                                        <p:attrNameLst>
+                                          <p:attrName>style.visibility</p:attrName>
+                                        </p:attrNameLst>
+                                      </p:cBhvr>
+                                      <p:to>
+                                        <p:strVal val="visible"/>
+                                      </p:to>
+                                    </p:set>
+                                    <p:animEffect transition="in" filter="fade">
+                                      <p:cBhvr>
+                                        <p:cTn id="23" dur="400"/>
+                                        <p:tgtEl>
+                                          <p:spTgt spid="4">
+                                            <p:txEl>
+                                              <p:pRg st="4" end="4"/>
+                                            </p:txEl>
+                                          </p:spTgt>
+                                        </p:tgtEl>
+                                      </p:cBhvr>
+                                    </p:animEffect>
+                                  </p:childTnLst>
+                                </p:cTn>
+                              </p:par>
+                              <p:par>
+                                <p:cTn id="24" presetID="42" presetClass="entr" presetSubtype="0" fill="hold" grpId="1" nodeType="withEffect">
+                                  <p:stCondLst>
+                                    <p:cond delay="250"/>
+                                  </p:stCondLst>
+                                  <p:iterate type="lt">
+                                    <p:tmPct val="10000"/>
+                                  </p:iterate>
+                                  <p:childTnLst>
+                                    <p:set>
+                                      <p:cBhvr>
+                                        <p:cTn id="25" dur="1" fill="hold">
+                                          <p:stCondLst>
+                                            <p:cond delay="0"/>
+                                          </p:stCondLst>
+                                        </p:cTn>
+                                        <p:tgtEl>
+                                          <p:spTgt spid="4"/>
+                                        </p:tgtEl>
+                                        <p:attrNameLst>
+                                          <p:attrName>style.visibility</p:attrName>
+                                        </p:attrNameLst>
+                                      </p:cBhvr>
+                                      <p:to>
+                                        <p:strVal val="visible"/>
+                                      </p:to>
+                                    </p:set>
+                                    <p:animEffect transition="in" filter="fade">
+                                      <p:cBhvr>
+                                        <p:cTn id="26" dur="250"/>
+                                        <p:tgtEl>
+                                          <p:spTgt spid="4"/>
+                                        </p:tgtEl>
+                                      </p:cBhvr>
+                                    </p:animEffect>
+                                    <p:anim calcmode="lin" valueType="num">
+                                      <p:cBhvr>
+                                        <p:cTn id="27" dur="250" fill="hold"/>
+                                        <p:tgtEl>
+                                          <p:spTgt spid="4"/>
+                                        </p:tgtEl>
+                                        <p:attrNameLst>
+                                          <p:attrName>ppt_x</p:attrName>
+                                        </p:attrNameLst>
+                                      </p:cBhvr>
+                                      <p:tavLst>
+                                        <p:tav tm="0">
+                                          <p:val>
+                                            <p:strVal val="#ppt_x"/>
+                                          </p:val>
+                                        </p:tav>
+                                        <p:tav tm="100000">
+                                          <p:val>
+                                            <p:strVal val="#ppt_x"/>
+                                          </p:val>
+                                        </p:tav>
+                                      </p:tavLst>
+                                    </p:anim>
+                                    <p:anim calcmode="lin" valueType="num">
+                                      <p:cBhvr>
+                                        <p:cTn id="28" dur="250" fill="hold"/>
+                                        <p:tgtEl>
+                                          <p:spTgt spid="4"/>
+                                        </p:tgtEl>
+                                        <p:attrNameLst>
+                                          <p:attrName>ppt_y</p:attrName>
+                                        </p:attrNameLst>
+                                      </p:cBhvr>
+                                      <p:tavLst>
+                                        <p:tav tm="0">
+                                          <p:val>
+                                            <p:strVal val="#ppt_y+.1"/>
+                                          </p:val>
+                                        </p:tav>
+                                        <p:tav tm="100000">
+                                          <p:val>
+                                            <p:strVal val="#ppt_y"/>
+                                          </p:val>
+                                        </p:tav>
+                                      </p:tavLst>
+                                    </p:anim>
+                                  </p:childTnLst>
+                                </p:cTn>
+                              </p:par>
+                            </p:childTnLst>
+                          </p:cTn>
+                        </p:par>
+                      </p:childTnLst>
+                    </p:cTn>
+                  </p:par>
+                </p:childTnLst>
+              </p:cTn>
+              <p:prevCondLst>
+                <p:cond evt="onPrev" delay="0">
+                  <p:tgtEl>
+                    <p:sldTgt/>
+                  </p:tgtEl>
+                </p:cond>
+              </p:prevCondLst>
+              <p:nextCondLst>
+                <p:cond evt="onNext" delay="0">
+                  <p:tgtEl>
+                    <p:sldTgt/>
+                  </p:tgtEl>
+                </p:cond>
+              </p:nextCondLst>
+            </p:seq>
+          </p:childTnLst>
+        </p:cTn>
+      </p:par>
+    </p:tnLst>
+    <p:bldLst>
+      <p:bldP spid="4" grpId="0" build="p"/>
+      <p:bldP spid="4" grpId="1"/>
+    </p:bldLst>
+  </p:timing>
+</p:sld>
+</file>
+
+<file path=ppt/slides/slide3.xml><?xml version="1.0" encoding="utf-8"?>
+<p:sld xmlns:a="http://schemas.openxmlformats.org/drawingml/2006/main" xmlns:r="http://schemas.openxmlformats.org/officeDocument/2006/relationships" xmlns:p="http://schemas.openxmlformats.org/presentationml/2006/main">
+  <p:cSld>
+    <p:spTree>
+      <p:nvGrpSpPr>
+        <p:cNvPr id="1" name=""/>
+        <p:cNvGrpSpPr/>
+        <p:nvPr/>
+      </p:nvGrpSpPr>
+      <p:grpSpPr>
+        <a:xfrm>
+          <a:off x="0" y="0"/>
+          <a:ext cx="0" cy="0"/>
+          <a:chOff x="0" y="0"/>
+          <a:chExt cx="0" cy="0"/>
+        </a:xfrm>
+      </p:grpSpPr>
+      <p:sp>
+        <p:nvSpPr>
+          <p:cNvPr id="2" name="Titolo 1">
+            <a:extLst>
+              <a:ext uri="{FF2B5EF4-FFF2-40B4-BE49-F238E27FC236}">
+                <a16:creationId xmlns:a16="http://schemas.microsoft.com/office/drawing/2014/main" id="{319E2CBA-C315-45C2-34CE-15F8E613D5FF}"/>
+              </a:ext>
+            </a:extLst>
+          </p:cNvPr>
+          <p:cNvSpPr>
+            <a:spLocks noGrp="1"/>
+          </p:cNvSpPr>
+          <p:nvPr>
+            <p:ph type="title"/>
+          </p:nvPr>
+        </p:nvSpPr>
+        <p:spPr/>
+        <p:txBody>
+          <a:bodyPr/>
+          <a:lstStyle/>
+          <a:p>
+            <a:r>
+              <a:rPr lang="it-IT" dirty="0"/>
+              <a:t>Programma Giorno 1</a:t>
+            </a:r>
+          </a:p>
+        </p:txBody>
+      </p:sp>
+      <p:sp>
+        <p:nvSpPr>
+          <p:cNvPr id="3" name="Segnaposto contenuto 2">
+            <a:extLst>
+              <a:ext uri="{FF2B5EF4-FFF2-40B4-BE49-F238E27FC236}">
+                <a16:creationId xmlns:a16="http://schemas.microsoft.com/office/drawing/2014/main" id="{3F20750C-BAA5-AA53-4645-FB3E88740FA8}"/>
+              </a:ext>
+            </a:extLst>
+          </p:cNvPr>
+          <p:cNvSpPr>
+            <a:spLocks noGrp="1"/>
+          </p:cNvSpPr>
+          <p:nvPr>
+            <p:ph idx="1"/>
+          </p:nvPr>
+        </p:nvSpPr>
+        <p:spPr/>
+        <p:txBody>
+          <a:bodyPr/>
+          <a:lstStyle/>
+          <a:p>
+            <a:r>
+              <a:rPr lang="it-IT" dirty="0"/>
+              <a:t>Introduzione Html e </a:t>
+            </a:r>
+            <a:r>
+              <a:rPr lang="it-IT" dirty="0" err="1"/>
+              <a:t>Javascript</a:t>
+            </a:r>
+            <a:endParaRPr lang="it-IT" dirty="0"/>
+          </a:p>
+          <a:p>
+            <a:r>
+              <a:rPr lang="it-IT" dirty="0"/>
+              <a:t>Panoramica su </a:t>
+            </a:r>
+            <a:r>
+              <a:rPr lang="it-IT" dirty="0" err="1"/>
+              <a:t>Blazor</a:t>
+            </a:r>
+            <a:r>
+              <a:rPr lang="it-IT" dirty="0"/>
+              <a:t> (Server vs </a:t>
+            </a:r>
+            <a:r>
+              <a:rPr lang="it-IT" dirty="0" err="1"/>
+              <a:t>WebAssembly</a:t>
+            </a:r>
+            <a:r>
+              <a:rPr lang="it-IT" dirty="0"/>
+              <a:t>)</a:t>
+            </a:r>
+          </a:p>
+          <a:p>
+            <a:r>
+              <a:rPr lang="it-IT" dirty="0" err="1"/>
+              <a:t>Razor</a:t>
+            </a:r>
+            <a:r>
+              <a:rPr lang="it-IT" dirty="0"/>
+              <a:t> e componenti base</a:t>
+            </a:r>
+          </a:p>
+          <a:p>
+            <a:r>
+              <a:rPr lang="it-IT" dirty="0"/>
+              <a:t>Ciclo di vita componenti e gestione eventi</a:t>
+            </a:r>
+          </a:p>
+        </p:txBody>
+      </p:sp>
+    </p:spTree>
+    <p:extLst>
+      <p:ext uri="{BB962C8B-B14F-4D97-AF65-F5344CB8AC3E}">
+        <p14:creationId xmlns:p14="http://schemas.microsoft.com/office/powerpoint/2010/main" val="1488116006"/>
+      </p:ext>
+    </p:extLst>
+  </p:cSld>
+  <p:clrMapOvr>
+    <a:masterClrMapping/>
+  </p:clrMapOvr>
+</p:sld>
+</file>
+
+<file path=ppt/slides/slide4.xml><?xml version="1.0" encoding="utf-8"?>
+<p:sld xmlns:a="http://schemas.openxmlformats.org/drawingml/2006/main" xmlns:r="http://schemas.openxmlformats.org/officeDocument/2006/relationships" xmlns:p="http://schemas.openxmlformats.org/presentationml/2006/main">
+  <p:cSld>
+    <p:spTree>
+      <p:nvGrpSpPr>
+        <p:cNvPr id="1" name="">
+          <a:extLst>
+            <a:ext uri="{FF2B5EF4-FFF2-40B4-BE49-F238E27FC236}">
+              <a16:creationId xmlns:a16="http://schemas.microsoft.com/office/drawing/2014/main" id="{30128656-ABCD-BC43-4749-47D045D3A001}"/>
+            </a:ext>
+          </a:extLst>
+        </p:cNvPr>
+        <p:cNvGrpSpPr/>
+        <p:nvPr/>
+      </p:nvGrpSpPr>
+      <p:grpSpPr>
+        <a:xfrm>
+          <a:off x="0" y="0"/>
+          <a:ext cx="0" cy="0"/>
+          <a:chOff x="0" y="0"/>
+          <a:chExt cx="0" cy="0"/>
+        </a:xfrm>
+      </p:grpSpPr>
+      <p:sp>
+        <p:nvSpPr>
+          <p:cNvPr id="2" name="Titolo 1">
+            <a:extLst>
+              <a:ext uri="{FF2B5EF4-FFF2-40B4-BE49-F238E27FC236}">
+                <a16:creationId xmlns:a16="http://schemas.microsoft.com/office/drawing/2014/main" id="{772BE159-96B3-F5A7-73C3-AA1968F4F44F}"/>
+              </a:ext>
+            </a:extLst>
+          </p:cNvPr>
+          <p:cNvSpPr>
+            <a:spLocks noGrp="1"/>
+          </p:cNvSpPr>
+          <p:nvPr>
+            <p:ph type="title"/>
+          </p:nvPr>
+        </p:nvSpPr>
+        <p:spPr/>
+        <p:txBody>
+          <a:bodyPr/>
+          <a:lstStyle/>
+          <a:p>
+            <a:r>
+              <a:rPr lang="it-IT" dirty="0"/>
+              <a:t>Programma Giorno 2</a:t>
+            </a:r>
+          </a:p>
+        </p:txBody>
+      </p:sp>
+      <p:sp>
+        <p:nvSpPr>
+          <p:cNvPr id="3" name="Segnaposto contenuto 2">
+            <a:extLst>
+              <a:ext uri="{FF2B5EF4-FFF2-40B4-BE49-F238E27FC236}">
+                <a16:creationId xmlns:a16="http://schemas.microsoft.com/office/drawing/2014/main" id="{4803E75C-6D3B-21B8-2145-C2C12FF5321C}"/>
+              </a:ext>
+            </a:extLst>
+          </p:cNvPr>
+          <p:cNvSpPr>
+            <a:spLocks noGrp="1"/>
+          </p:cNvSpPr>
+          <p:nvPr>
+            <p:ph idx="1"/>
+          </p:nvPr>
+        </p:nvSpPr>
+        <p:spPr/>
+        <p:txBody>
+          <a:bodyPr/>
+          <a:lstStyle/>
+          <a:p>
+            <a:r>
+              <a:rPr lang="it-IT" dirty="0"/>
+              <a:t>Api </a:t>
+            </a:r>
+            <a:r>
+              <a:rPr lang="it-IT" dirty="0" err="1"/>
+              <a:t>rest</a:t>
+            </a:r>
+            <a:r>
+              <a:rPr lang="it-IT" dirty="0"/>
+              <a:t> con </a:t>
+            </a:r>
+            <a:r>
+              <a:rPr lang="it-IT" dirty="0" err="1"/>
+              <a:t>HttpClient</a:t>
+            </a:r>
+            <a:endParaRPr lang="it-IT" dirty="0"/>
+          </a:p>
+          <a:p>
+            <a:r>
+              <a:rPr lang="it-IT" dirty="0" err="1"/>
+              <a:t>Dependency</a:t>
+            </a:r>
+            <a:r>
+              <a:rPr lang="it-IT" dirty="0"/>
+              <a:t> Injection</a:t>
+            </a:r>
+          </a:p>
+          <a:p>
+            <a:r>
+              <a:rPr lang="it-IT" dirty="0"/>
+              <a:t>Stato (</a:t>
+            </a:r>
+            <a:r>
+              <a:rPr lang="it-IT" dirty="0" err="1"/>
+              <a:t>sessionStorage</a:t>
+            </a:r>
+            <a:r>
+              <a:rPr lang="it-IT" dirty="0"/>
+              <a:t>/</a:t>
+            </a:r>
+            <a:r>
+              <a:rPr lang="it-IT" dirty="0" err="1"/>
+              <a:t>localStorage</a:t>
+            </a:r>
+            <a:r>
+              <a:rPr lang="it-IT" dirty="0"/>
+              <a:t>)</a:t>
+            </a:r>
+          </a:p>
+          <a:p>
+            <a:r>
+              <a:rPr lang="it-IT" dirty="0"/>
+              <a:t>Implementazione </a:t>
+            </a:r>
+            <a:r>
+              <a:rPr lang="it-IT" dirty="0" err="1"/>
+              <a:t>SignalR</a:t>
+            </a:r>
+            <a:endParaRPr lang="it-IT" dirty="0"/>
+          </a:p>
+        </p:txBody>
+      </p:sp>
+    </p:spTree>
+    <p:extLst>
+      <p:ext uri="{BB962C8B-B14F-4D97-AF65-F5344CB8AC3E}">
+        <p14:creationId xmlns:p14="http://schemas.microsoft.com/office/powerpoint/2010/main" val="766020423"/>
+      </p:ext>
+    </p:extLst>
+  </p:cSld>
+  <p:clrMapOvr>
+    <a:masterClrMapping/>
+  </p:clrMapOvr>
+</p:sld>
+</file>
+
+<file path=ppt/slides/slide5.xml><?xml version="1.0" encoding="utf-8"?>
+<p:sld xmlns:a="http://schemas.openxmlformats.org/drawingml/2006/main" xmlns:r="http://schemas.openxmlformats.org/officeDocument/2006/relationships" xmlns:p="http://schemas.openxmlformats.org/presentationml/2006/main">
+  <p:cSld>
+    <p:spTree>
+      <p:nvGrpSpPr>
+        <p:cNvPr id="1" name="">
+          <a:extLst>
+            <a:ext uri="{FF2B5EF4-FFF2-40B4-BE49-F238E27FC236}">
+              <a16:creationId xmlns:a16="http://schemas.microsoft.com/office/drawing/2014/main" id="{A2D35616-2F3B-AA8F-7263-3CEA683909B1}"/>
+            </a:ext>
+          </a:extLst>
+        </p:cNvPr>
+        <p:cNvGrpSpPr/>
+        <p:nvPr/>
+      </p:nvGrpSpPr>
+      <p:grpSpPr>
+        <a:xfrm>
+          <a:off x="0" y="0"/>
+          <a:ext cx="0" cy="0"/>
+          <a:chOff x="0" y="0"/>
+          <a:chExt cx="0" cy="0"/>
+        </a:xfrm>
+      </p:grpSpPr>
+      <p:sp>
+        <p:nvSpPr>
+          <p:cNvPr id="2" name="Titolo 1">
+            <a:extLst>
+              <a:ext uri="{FF2B5EF4-FFF2-40B4-BE49-F238E27FC236}">
+                <a16:creationId xmlns:a16="http://schemas.microsoft.com/office/drawing/2014/main" id="{97CF0F3A-78CF-DDA1-6A13-C0E75A3EC53C}"/>
+              </a:ext>
+            </a:extLst>
+          </p:cNvPr>
+          <p:cNvSpPr>
+            <a:spLocks noGrp="1"/>
+          </p:cNvSpPr>
+          <p:nvPr>
+            <p:ph type="title"/>
+          </p:nvPr>
+        </p:nvSpPr>
+        <p:spPr/>
+        <p:txBody>
+          <a:bodyPr/>
+          <a:lstStyle/>
+          <a:p>
+            <a:r>
+              <a:rPr lang="it-IT" dirty="0"/>
+              <a:t>Programma giorno 3</a:t>
+            </a:r>
+          </a:p>
+        </p:txBody>
+      </p:sp>
+      <p:sp>
+        <p:nvSpPr>
+          <p:cNvPr id="3" name="Segnaposto contenuto 2">
+            <a:extLst>
+              <a:ext uri="{FF2B5EF4-FFF2-40B4-BE49-F238E27FC236}">
+                <a16:creationId xmlns:a16="http://schemas.microsoft.com/office/drawing/2014/main" id="{E34DA367-8093-223A-25DE-595E3B6D4D72}"/>
+              </a:ext>
+            </a:extLst>
+          </p:cNvPr>
+          <p:cNvSpPr>
+            <a:spLocks noGrp="1"/>
+          </p:cNvSpPr>
+          <p:nvPr>
+            <p:ph idx="1"/>
+          </p:nvPr>
+        </p:nvSpPr>
+        <p:spPr/>
+        <p:txBody>
+          <a:bodyPr/>
+          <a:lstStyle/>
+          <a:p>
+            <a:r>
+              <a:rPr lang="it-IT" dirty="0"/>
+              <a:t>Utilizzo di HTML e CSS in </a:t>
+            </a:r>
+            <a:r>
+              <a:rPr lang="it-IT" dirty="0" err="1"/>
+              <a:t>blazor</a:t>
+            </a:r>
+            <a:r>
+              <a:rPr lang="it-IT" dirty="0"/>
+              <a:t> per lo styling</a:t>
+            </a:r>
+          </a:p>
+          <a:p>
+            <a:r>
+              <a:rPr lang="it-IT" dirty="0"/>
+              <a:t>Librerie di componenti</a:t>
+            </a:r>
+          </a:p>
+          <a:p>
+            <a:r>
+              <a:rPr lang="it-IT" dirty="0"/>
+              <a:t>Esercizi pratici</a:t>
+            </a:r>
+          </a:p>
+        </p:txBody>
+      </p:sp>
+    </p:spTree>
+    <p:extLst>
+      <p:ext uri="{BB962C8B-B14F-4D97-AF65-F5344CB8AC3E}">
+        <p14:creationId xmlns:p14="http://schemas.microsoft.com/office/powerpoint/2010/main" val="1502349550"/>
+      </p:ext>
+    </p:extLst>
+  </p:cSld>
+  <p:clrMapOvr>
+    <a:masterClrMapping/>
+  </p:clrMapOvr>
+</p:sld>
+</file>
+
+<file path=ppt/slides/slide6.xml><?xml version="1.0" encoding="utf-8"?>
+<p:sld xmlns:a="http://schemas.openxmlformats.org/drawingml/2006/main" xmlns:r="http://schemas.openxmlformats.org/officeDocument/2006/relationships" xmlns:p="http://schemas.openxmlformats.org/presentationml/2006/main">
+  <p:cSld>
+    <p:spTree>
+      <p:nvGrpSpPr>
+        <p:cNvPr id="1" name="">
+          <a:extLst>
+            <a:ext uri="{FF2B5EF4-FFF2-40B4-BE49-F238E27FC236}">
+              <a16:creationId xmlns:a16="http://schemas.microsoft.com/office/drawing/2014/main" id="{448098F0-C21C-5D9C-D2A8-269B82CC068D}"/>
+            </a:ext>
+          </a:extLst>
+        </p:cNvPr>
+        <p:cNvGrpSpPr/>
+        <p:nvPr/>
+      </p:nvGrpSpPr>
+      <p:grpSpPr>
+        <a:xfrm>
+          <a:off x="0" y="0"/>
+          <a:ext cx="0" cy="0"/>
+          <a:chOff x="0" y="0"/>
+          <a:chExt cx="0" cy="0"/>
+        </a:xfrm>
+      </p:grpSpPr>
+      <p:sp>
+        <p:nvSpPr>
+          <p:cNvPr id="2" name="Titolo 1">
+            <a:extLst>
+              <a:ext uri="{FF2B5EF4-FFF2-40B4-BE49-F238E27FC236}">
+                <a16:creationId xmlns:a16="http://schemas.microsoft.com/office/drawing/2014/main" id="{44832A39-D223-310C-393D-9BB960073BAB}"/>
+              </a:ext>
+            </a:extLst>
+          </p:cNvPr>
+          <p:cNvSpPr>
+            <a:spLocks noGrp="1"/>
+          </p:cNvSpPr>
+          <p:nvPr>
+            <p:ph type="title"/>
+          </p:nvPr>
+        </p:nvSpPr>
+        <p:spPr/>
+        <p:txBody>
+          <a:bodyPr/>
+          <a:lstStyle/>
+          <a:p>
+            <a:r>
+              <a:rPr lang="it-IT" dirty="0"/>
+              <a:t>Programma giorno 4</a:t>
+            </a:r>
+          </a:p>
+        </p:txBody>
+      </p:sp>
+      <p:sp>
+        <p:nvSpPr>
+          <p:cNvPr id="3" name="Segnaposto contenuto 2">
+            <a:extLst>
+              <a:ext uri="{FF2B5EF4-FFF2-40B4-BE49-F238E27FC236}">
+                <a16:creationId xmlns:a16="http://schemas.microsoft.com/office/drawing/2014/main" id="{7B17C3E2-FEFF-08A5-E7A3-104CE018326C}"/>
+              </a:ext>
+            </a:extLst>
+          </p:cNvPr>
+          <p:cNvSpPr>
+            <a:spLocks noGrp="1"/>
+          </p:cNvSpPr>
+          <p:nvPr>
+            <p:ph idx="1"/>
+          </p:nvPr>
+        </p:nvSpPr>
+        <p:spPr/>
+        <p:txBody>
+          <a:bodyPr/>
+          <a:lstStyle/>
+          <a:p>
+            <a:r>
+              <a:rPr lang="it-IT" dirty="0"/>
+              <a:t>Approfondimenti ed esercitazioni</a:t>
+            </a:r>
+          </a:p>
+        </p:txBody>
+      </p:sp>
+    </p:spTree>
+    <p:extLst>
+      <p:ext uri="{BB962C8B-B14F-4D97-AF65-F5344CB8AC3E}">
+        <p14:creationId xmlns:p14="http://schemas.microsoft.com/office/powerpoint/2010/main" val="206916150"/>
+      </p:ext>
+    </p:extLst>
+  </p:cSld>
+  <p:clrMapOvr>
+    <a:masterClrMapping/>
+  </p:clrMapOvr>
+</p:sld>
+</file>
+
+<file path=ppt/slides/slide7.xml><?xml version="1.0" encoding="utf-8"?>
+<p:sld xmlns:a="http://schemas.openxmlformats.org/drawingml/2006/main" xmlns:r="http://schemas.openxmlformats.org/officeDocument/2006/relationships" xmlns:p="http://schemas.openxmlformats.org/presentationml/2006/main">
+  <p:cSld>
+    <p:spTree>
+      <p:nvGrpSpPr>
+        <p:cNvPr id="1" name="">
+          <a:extLst>
+            <a:ext uri="{FF2B5EF4-FFF2-40B4-BE49-F238E27FC236}">
+              <a16:creationId xmlns:a16="http://schemas.microsoft.com/office/drawing/2014/main" id="{6E423314-DF2E-1571-75AB-57E33DB1EED6}"/>
+            </a:ext>
+          </a:extLst>
+        </p:cNvPr>
+        <p:cNvGrpSpPr/>
+        <p:nvPr/>
+      </p:nvGrpSpPr>
+      <p:grpSpPr>
+        <a:xfrm>
+          <a:off x="0" y="0"/>
+          <a:ext cx="0" cy="0"/>
+          <a:chOff x="0" y="0"/>
+          <a:chExt cx="0" cy="0"/>
+        </a:xfrm>
+      </p:grpSpPr>
+      <p:sp>
+        <p:nvSpPr>
+          <p:cNvPr id="2" name="Titolo 1">
+            <a:extLst>
+              <a:ext uri="{FF2B5EF4-FFF2-40B4-BE49-F238E27FC236}">
+                <a16:creationId xmlns:a16="http://schemas.microsoft.com/office/drawing/2014/main" id="{E757FD1F-E40D-2422-81D1-346149184779}"/>
+              </a:ext>
+            </a:extLst>
+          </p:cNvPr>
+          <p:cNvSpPr>
+            <a:spLocks noGrp="1"/>
+          </p:cNvSpPr>
+          <p:nvPr>
+            <p:ph type="title"/>
+          </p:nvPr>
+        </p:nvSpPr>
+        <p:spPr/>
+        <p:txBody>
+          <a:bodyPr/>
+          <a:lstStyle/>
+          <a:p>
+            <a:r>
+              <a:rPr lang="it-IT" dirty="0"/>
+              <a:t>Perché </a:t>
+            </a:r>
+            <a:r>
+              <a:rPr lang="it-IT" dirty="0" err="1"/>
+              <a:t>blazor</a:t>
+            </a:r>
+            <a:endParaRPr lang="it-IT" dirty="0"/>
+          </a:p>
+        </p:txBody>
+      </p:sp>
+      <p:sp>
+        <p:nvSpPr>
+          <p:cNvPr id="4" name="Segnaposto contenuto 3">
+            <a:extLst>
+              <a:ext uri="{FF2B5EF4-FFF2-40B4-BE49-F238E27FC236}">
+                <a16:creationId xmlns:a16="http://schemas.microsoft.com/office/drawing/2014/main" id="{4A64EE40-5309-49BE-DE03-7C6B44D4B233}"/>
+              </a:ext>
+            </a:extLst>
+          </p:cNvPr>
+          <p:cNvSpPr>
+            <a:spLocks noGrp="1"/>
+          </p:cNvSpPr>
+          <p:nvPr>
+            <p:ph idx="1"/>
+          </p:nvPr>
+        </p:nvSpPr>
+        <p:spPr/>
+        <p:txBody>
+          <a:bodyPr/>
+          <a:lstStyle/>
+          <a:p>
+            <a:r>
+              <a:rPr lang="it-IT" dirty="0"/>
+              <a:t>Riuso delle competenze</a:t>
+            </a:r>
+          </a:p>
+          <a:p>
+            <a:r>
+              <a:rPr lang="it-IT" dirty="0"/>
+              <a:t>Riuso del codice tra client e server</a:t>
+            </a:r>
+          </a:p>
+          <a:p>
+            <a:r>
+              <a:rPr lang="it-IT" dirty="0"/>
+              <a:t>Debug</a:t>
+            </a:r>
+          </a:p>
+        </p:txBody>
+      </p:sp>
+    </p:spTree>
+    <p:extLst>
+      <p:ext uri="{BB962C8B-B14F-4D97-AF65-F5344CB8AC3E}">
+        <p14:creationId xmlns:p14="http://schemas.microsoft.com/office/powerpoint/2010/main" val="682428772"/>
+      </p:ext>
+    </p:extLst>
+  </p:cSld>
+  <p:clrMapOvr>
+    <a:masterClrMapping/>
+  </p:clrMapOvr>
+</p:sld>
+</file>
+
+<file path=ppt/slides/slide8.xml><?xml version="1.0" encoding="utf-8"?>
+<p:sld xmlns:a="http://schemas.openxmlformats.org/drawingml/2006/main" xmlns:r="http://schemas.openxmlformats.org/officeDocument/2006/relationships" xmlns:p="http://schemas.openxmlformats.org/presentationml/2006/main">
+  <p:cSld>
+    <p:spTree>
+      <p:nvGrpSpPr>
+        <p:cNvPr id="1" name="">
+          <a:extLst>
+            <a:ext uri="{FF2B5EF4-FFF2-40B4-BE49-F238E27FC236}">
+              <a16:creationId xmlns:a16="http://schemas.microsoft.com/office/drawing/2014/main" id="{029E0FAA-C51C-03B1-B0EA-09726CD45C95}"/>
+            </a:ext>
+          </a:extLst>
+        </p:cNvPr>
+        <p:cNvGrpSpPr/>
+        <p:nvPr/>
+      </p:nvGrpSpPr>
+      <p:grpSpPr>
+        <a:xfrm>
+          <a:off x="0" y="0"/>
+          <a:ext cx="0" cy="0"/>
+          <a:chOff x="0" y="0"/>
+          <a:chExt cx="0" cy="0"/>
+        </a:xfrm>
+      </p:grpSpPr>
+      <p:sp>
+        <p:nvSpPr>
+          <p:cNvPr id="2" name="Titolo 1">
+            <a:extLst>
+              <a:ext uri="{FF2B5EF4-FFF2-40B4-BE49-F238E27FC236}">
+                <a16:creationId xmlns:a16="http://schemas.microsoft.com/office/drawing/2014/main" id="{5FFCFF37-0116-8B31-F39D-E4BE360D6792}"/>
+              </a:ext>
+            </a:extLst>
+          </p:cNvPr>
+          <p:cNvSpPr>
+            <a:spLocks noGrp="1"/>
+          </p:cNvSpPr>
+          <p:nvPr>
+            <p:ph type="title"/>
+          </p:nvPr>
+        </p:nvSpPr>
+        <p:spPr/>
+        <p:txBody>
+          <a:bodyPr/>
+          <a:lstStyle/>
+          <a:p>
+            <a:r>
+              <a:rPr lang="it-IT" dirty="0"/>
+              <a:t>Prerequisiti</a:t>
+            </a:r>
+          </a:p>
+        </p:txBody>
+      </p:sp>
+      <p:pic>
+        <p:nvPicPr>
+          <p:cNvPr id="5" name="Segnaposto contenuto 4">
+            <a:extLst>
+              <a:ext uri="{FF2B5EF4-FFF2-40B4-BE49-F238E27FC236}">
+                <a16:creationId xmlns:a16="http://schemas.microsoft.com/office/drawing/2014/main" id="{47C200BD-A846-C94A-54AB-3910BE7D359C}"/>
+              </a:ext>
+            </a:extLst>
+          </p:cNvPr>
+          <p:cNvPicPr>
+            <a:picLocks noGrp="1" noChangeAspect="1"/>
+          </p:cNvPicPr>
+          <p:nvPr>
+            <p:ph idx="1"/>
+          </p:nvPr>
+        </p:nvPicPr>
+        <p:blipFill>
+          <a:blip r:embed="rId2"/>
+          <a:stretch>
+            <a:fillRect/>
+          </a:stretch>
+        </p:blipFill>
+        <p:spPr>
+          <a:xfrm>
+            <a:off x="1980625" y="2700947"/>
+            <a:ext cx="8230749" cy="2638793"/>
+          </a:xfrm>
+          <a:prstGeom prst="rect">
+            <a:avLst/>
+          </a:prstGeom>
+        </p:spPr>
+      </p:pic>
+    </p:spTree>
+    <p:extLst>
+      <p:ext uri="{BB962C8B-B14F-4D97-AF65-F5344CB8AC3E}">
+        <p14:creationId xmlns:p14="http://schemas.microsoft.com/office/powerpoint/2010/main" val="2452434470"/>
+      </p:ext>
+    </p:extLst>
+  </p:cSld>
+  <p:clrMapOvr>
+    <a:masterClrMapping/>
+  </p:clrMapOvr>
+</p:sld>
+</file>
+
+<file path=ppt/slides/slide9.xml><?xml version="1.0" encoding="utf-8"?>
+<p:sld xmlns:a="http://schemas.openxmlformats.org/drawingml/2006/main" xmlns:r="http://schemas.openxmlformats.org/officeDocument/2006/relationships" xmlns:p="http://schemas.openxmlformats.org/presentationml/2006/main">
+  <p:cSld>
+    <p:spTree>
+      <p:nvGrpSpPr>
+        <p:cNvPr id="1" name="">
+          <a:extLst>
+            <a:ext uri="{FF2B5EF4-FFF2-40B4-BE49-F238E27FC236}">
+              <a16:creationId xmlns:a16="http://schemas.microsoft.com/office/drawing/2014/main" id="{05B8572D-8674-0A1F-6650-4B55475C3861}"/>
+            </a:ext>
+          </a:extLst>
+        </p:cNvPr>
+        <p:cNvGrpSpPr/>
+        <p:nvPr/>
+      </p:nvGrpSpPr>
+      <p:grpSpPr>
+        <a:xfrm>
+          <a:off x="0" y="0"/>
+          <a:ext cx="0" cy="0"/>
+          <a:chOff x="0" y="0"/>
+          <a:chExt cx="0" cy="0"/>
+        </a:xfrm>
+      </p:grpSpPr>
+      <p:sp>
+        <p:nvSpPr>
+          <p:cNvPr id="2" name="Titolo 1">
+            <a:extLst>
+              <a:ext uri="{FF2B5EF4-FFF2-40B4-BE49-F238E27FC236}">
+                <a16:creationId xmlns:a16="http://schemas.microsoft.com/office/drawing/2014/main" id="{18AB9C9D-14E6-DD49-AF91-9999749C8662}"/>
+              </a:ext>
+            </a:extLst>
+          </p:cNvPr>
+          <p:cNvSpPr>
+            <a:spLocks noGrp="1"/>
+          </p:cNvSpPr>
+          <p:nvPr>
+            <p:ph type="title"/>
+          </p:nvPr>
+        </p:nvSpPr>
+        <p:spPr/>
+        <p:txBody>
+          <a:bodyPr/>
+          <a:lstStyle/>
+          <a:p>
+            <a:r>
+              <a:rPr lang="en-US" b="1" dirty="0"/>
+              <a:t>HTML</a:t>
+            </a:r>
+            <a:endParaRPr lang="it-IT" dirty="0"/>
+          </a:p>
+        </p:txBody>
+      </p:sp>
+      <p:pic>
+        <p:nvPicPr>
+          <p:cNvPr id="7" name="Segnaposto contenuto 6">
+            <a:extLst>
+              <a:ext uri="{FF2B5EF4-FFF2-40B4-BE49-F238E27FC236}">
+                <a16:creationId xmlns:a16="http://schemas.microsoft.com/office/drawing/2014/main" id="{FEB49A69-7066-A9C3-1EC7-0751140ACDFB}"/>
+              </a:ext>
+            </a:extLst>
+          </p:cNvPr>
+          <p:cNvPicPr>
+            <a:picLocks noGrp="1" noChangeAspect="1"/>
+          </p:cNvPicPr>
+          <p:nvPr>
+            <p:ph sz="half" idx="2"/>
+          </p:nvPr>
+        </p:nvPicPr>
+        <p:blipFill>
+          <a:blip r:embed="rId2"/>
+          <a:stretch>
+            <a:fillRect/>
+          </a:stretch>
+        </p:blipFill>
+        <p:spPr>
+          <a:xfrm>
+            <a:off x="6188075" y="2733748"/>
+            <a:ext cx="5422900" cy="2620816"/>
+          </a:xfrm>
+          <a:prstGeom prst="rect">
+            <a:avLst/>
+          </a:prstGeom>
+        </p:spPr>
+      </p:pic>
+      <p:sp>
+        <p:nvSpPr>
+          <p:cNvPr id="5" name="Segnaposto contenuto 4">
+            <a:extLst>
+              <a:ext uri="{FF2B5EF4-FFF2-40B4-BE49-F238E27FC236}">
+                <a16:creationId xmlns:a16="http://schemas.microsoft.com/office/drawing/2014/main" id="{717F48EC-62E2-6A75-FEC4-C507C35E69B3}"/>
+              </a:ext>
+            </a:extLst>
+          </p:cNvPr>
+          <p:cNvSpPr>
+            <a:spLocks noGrp="1"/>
+          </p:cNvSpPr>
+          <p:nvPr>
+            <p:ph sz="half" idx="1"/>
+          </p:nvPr>
+        </p:nvSpPr>
+        <p:spPr/>
+        <p:txBody>
+          <a:bodyPr>
+            <a:normAutofit fontScale="70000" lnSpcReduction="20000"/>
+          </a:bodyPr>
+          <a:lstStyle/>
+          <a:p>
+            <a:pPr marL="0" indent="0">
+              <a:buNone/>
+            </a:pPr>
+            <a:r>
+              <a:rPr lang="it-IT" dirty="0"/>
+              <a:t>Elementi costitutivi di una pagina Web L'HTML (</a:t>
+            </a:r>
+            <a:r>
+              <a:rPr lang="it-IT" dirty="0" err="1"/>
+              <a:t>Hypertext</a:t>
+            </a:r>
+            <a:r>
+              <a:rPr lang="it-IT" dirty="0"/>
+              <a:t> Markup Language) è la spina dorsale di ogni pagina Web. Definisce la struttura e il contenuto di una pagina web utilizzando vari elementi, come intestazioni, paragrafi, immagini, collegamenti ed elenchi. Ecco alcuni punti chiave da capire:</a:t>
+            </a:r>
+          </a:p>
+          <a:p>
+            <a:pPr marL="0" indent="0">
+              <a:buNone/>
+            </a:pPr>
+            <a:br>
+              <a:rPr lang="it-IT" dirty="0"/>
+            </a:br>
+            <a:endParaRPr lang="it-IT" dirty="0"/>
+          </a:p>
+          <a:p>
+            <a:r>
+              <a:rPr lang="it-IT" dirty="0"/>
+              <a:t>Struttura HTML di base: gli elementi essenziali come , , e .</a:t>
+            </a:r>
+            <a:r>
+              <a:rPr lang="it-IT" b="1" dirty="0"/>
+              <a:t>&lt;html&gt;&lt;head&gt;&lt;body&gt;</a:t>
+            </a:r>
+            <a:endParaRPr lang="it-IT" dirty="0"/>
+          </a:p>
+          <a:p>
+            <a:r>
+              <a:rPr lang="it-IT" dirty="0"/>
+              <a:t>Tag e attributi: come utilizzare tag come , , , e attributi come , , e .</a:t>
+            </a:r>
+            <a:r>
+              <a:rPr lang="it-IT" b="1" dirty="0"/>
+              <a:t>&lt;h1&gt;&lt;p&gt;&lt;</a:t>
+            </a:r>
+            <a:r>
+              <a:rPr lang="it-IT" b="1" dirty="0" err="1"/>
+              <a:t>img</a:t>
+            </a:r>
+            <a:r>
+              <a:rPr lang="it-IT" b="1" dirty="0"/>
+              <a:t>&gt;</a:t>
+            </a:r>
+            <a:r>
+              <a:rPr lang="it-IT" b="1" dirty="0" err="1"/>
+              <a:t>srcalthref</a:t>
+            </a:r>
+            <a:endParaRPr lang="it-IT" dirty="0"/>
+          </a:p>
+          <a:p>
+            <a:r>
+              <a:rPr lang="it-IT" dirty="0"/>
+              <a:t>Elementi semantici: Introduzione ai tag semantici come , , , e al loro significato nella strutturazione dei contenuti.</a:t>
+            </a:r>
+            <a:r>
+              <a:rPr lang="it-IT" b="1" dirty="0"/>
+              <a:t>&lt;</a:t>
+            </a:r>
+            <a:r>
+              <a:rPr lang="it-IT" b="1" dirty="0" err="1"/>
+              <a:t>header</a:t>
+            </a:r>
+            <a:r>
+              <a:rPr lang="it-IT" b="1" dirty="0"/>
+              <a:t>&gt;&lt;</a:t>
+            </a:r>
+            <a:r>
+              <a:rPr lang="it-IT" b="1" dirty="0" err="1"/>
+              <a:t>nav</a:t>
+            </a:r>
+            <a:r>
+              <a:rPr lang="it-IT" b="1" dirty="0"/>
+              <a:t>&gt;&lt;</a:t>
+            </a:r>
+            <a:r>
+              <a:rPr lang="it-IT" b="1" dirty="0" err="1"/>
+              <a:t>section</a:t>
+            </a:r>
+            <a:r>
+              <a:rPr lang="it-IT" b="1" dirty="0"/>
+              <a:t>&gt;</a:t>
+            </a:r>
+            <a:endParaRPr lang="it-IT" dirty="0"/>
+          </a:p>
+          <a:p>
+            <a:r>
+              <a:rPr lang="it-IT" dirty="0"/>
+              <a:t>Creazione di moduli: comprensione degli elementi del modulo come , , , e dei relativi attributi per l'input dell'utente.</a:t>
+            </a:r>
+            <a:r>
+              <a:rPr lang="it-IT" b="1" dirty="0"/>
+              <a:t>&lt;input&gt;&lt;</a:t>
+            </a:r>
+            <a:r>
+              <a:rPr lang="it-IT" b="1" dirty="0" err="1"/>
+              <a:t>select</a:t>
+            </a:r>
+            <a:r>
+              <a:rPr lang="it-IT" b="1" dirty="0"/>
+              <a:t>&gt;&lt;</a:t>
+            </a:r>
+            <a:r>
+              <a:rPr lang="it-IT" b="1" dirty="0" err="1"/>
+              <a:t>textarea</a:t>
+            </a:r>
+            <a:r>
+              <a:rPr lang="it-IT" b="1" dirty="0"/>
+              <a:t>&gt;</a:t>
+            </a:r>
+            <a:endParaRPr lang="it-IT" dirty="0"/>
+          </a:p>
+          <a:p>
+            <a:endParaRPr lang="it-IT" dirty="0"/>
+          </a:p>
+        </p:txBody>
+      </p:sp>
+    </p:spTree>
+    <p:extLst>
+      <p:ext uri="{BB962C8B-B14F-4D97-AF65-F5344CB8AC3E}">
+        <p14:creationId xmlns:p14="http://schemas.microsoft.com/office/powerpoint/2010/main" val="2818506233"/>
       </p:ext>
     </p:extLst>
   </p:cSld>

</xml_diff>